<commit_message>
Juno: check in to OLPRODLOC.
</commit_message>
<xml_diff>
--- a/ResourceFiles/Mystic Spice Premium Chai Market Analysis Presentation.pptx
+++ b/ResourceFiles/Mystic Spice Premium Chai Market Analysis Presentation.pptx
@@ -524,7 +524,7 @@
                 <a:ea typeface="Aptos"/>
                 <a:cs typeface="Aptos"/>
               </a:rPr>
-              <a:t>Diese Präsentation wurde automatisch von PowerPoint Copilot basierend auf inhalten generiert, die in diesem Dokument gefunden wurden:</a:t>
+              <a:t>Diese Präsentation wurde automatisch von PowerPoint Copilot generiert und basiert auf Inhalten, die in diesem Dokument gefunden wurden:</a:t>
             </a:r>
             <a:r>
               <a:rPr sz="1200"/>
@@ -568,7 +568,7 @@
                 <a:ea typeface="Aptos"/>
                 <a:cs typeface="Aptos"/>
               </a:rPr>
-              <a:t>VON KI generierten Inhalten sind möglicherweise falsch.</a:t>
+              <a:t>VON KI generierte Inhalte sind möglicherweise nicht korrekt.</a:t>
             </a:r>
           </a:p>
         </p:txBody>
@@ -736,7 +736,7 @@
                 <a:ea typeface="Aptos"/>
                 <a:cs typeface="Aptos"/>
               </a:rPr>
-              <a:t>Original Content:</a:t>
+              <a:t>Originalinhalt:</a:t>
             </a:r>
             <a:r>
               <a:rPr sz="1200"/>
@@ -753,7 +753,7 @@
                 <a:ea typeface="Aptos"/>
                 <a:cs typeface="Aptos"/>
               </a:rPr>
-              <a:t>Distributoren sind die Unternehmen, die Chai-Teeprodukte im Namen der Hersteller oder Großhändler vertreten und vertreiben.</a:t>
+              <a:t>Vertriebspartner sind die Unternehmen, die Chai-Tee-Produkte im Namen der Hersteller oder Großhändler vertreten und vertreiben.</a:t>
             </a:r>
             <a:r>
               <a:rPr lang="de-DE" sz="1200" b="0" i="0" strike="noStrike" cap="none" baseline="0">
@@ -825,7 +825,12 @@
                 <a:ea typeface="Aptos"/>
                 <a:cs typeface="Aptos"/>
               </a:rPr>
-              <a:t>Zu den wichtigsten Vertriebspartnern für Chai-Tee-Produkte in Lateinamerika gehören Unilever, Nestle, Coca-Cola und PepsiCo.</a:t>
+              <a:t>Zu den wichtigsten Vertriebspartnern von Chai-Tee-Produkten in Lateinamerika gehören Unilever, Nestle, Coca-Cola und PepsiCo.</a:t>
+            </a:r>
+            <a:r>
+              <a:rPr sz="1200"/>
+              <a:t>
+</a:t>
             </a:r>
           </a:p>
         </p:txBody>
@@ -966,7 +971,7 @@
                 <a:ea typeface="Aptos"/>
                 <a:cs typeface="Aptos"/>
               </a:rPr>
-              <a:t>Der Plan wird über 12 Monate mit einem Budget von 100.000 US-Dollar implementiert und mithilfe von Schlüsselleistungsindikatoren ausgewertet.</a:t>
+              <a:t>Der Plan wird über 12 Monate mit einem Budget von 100.000 US-Dollar implementiert und mithilfe von wichtigen Leistungsindikatoren ausgewertet.</a:t>
             </a:r>
             <a:r>
               <a:rPr sz="1200"/>
@@ -993,7 +998,7 @@
                 <a:ea typeface="Aptos"/>
                 <a:cs typeface="Aptos"/>
               </a:rPr>
-              <a:t>Ursprünglicher Inhalt:</a:t>
+              <a:t>Originalinhalt:</a:t>
             </a:r>
             <a:r>
               <a:rPr sz="1200"/>
@@ -1010,7 +1015,7 @@
                 <a:ea typeface="Aptos"/>
                 <a:cs typeface="Aptos"/>
               </a:rPr>
-              <a:t>Promotionsplan und Strategie</a:t>
+              <a:t>Werbeplan und -strategie</a:t>
             </a:r>
             <a:r>
               <a:rPr sz="1200"/>
@@ -1027,7 +1032,7 @@
                 <a:ea typeface="Aptos"/>
                 <a:cs typeface="Aptos"/>
               </a:rPr>
-              <a:t>Der Promotionsplan und die Strategie für Chai-Tee in Lateinamerika zielt darauf ab, die folgenden Ziele zu erreichen:</a:t>
+              <a:t>Der Werbeplan und die Werbestrategie für Chai-Tee in Lateinamerika zielen darauf ab, die folgenden Ziele zu erreichen:</a:t>
             </a:r>
             <a:r>
               <a:rPr sz="1200"/>
@@ -1044,7 +1049,7 @@
                 <a:ea typeface="Aptos"/>
                 <a:cs typeface="Aptos"/>
               </a:rPr>
-              <a:t>·         Bewusstsein und Interesse an Chai-Tee unter der Zielgruppe</a:t>
+              <a:t>· Steigerung des Bewusstseins für und des Interesses an Chai-Tee in der Zielgruppe</a:t>
             </a:r>
             <a:r>
               <a:rPr sz="1200"/>
@@ -1061,7 +1066,7 @@
                 <a:ea typeface="Aptos"/>
                 <a:cs typeface="Aptos"/>
               </a:rPr>
-              <a:t> erhöhen·         Position Chai Tee als Premium-, Natürliches und gesundes Produkt, das ein einzigartiges und befriedigendes Erlebnis</a:t>
+              <a:t>· Positionierung von Chai-Tee als natürliches und gesundes Premium-Produkt, das einen einzigartigen Genuss bietet</a:t>
             </a:r>
             <a:r>
               <a:rPr sz="1200"/>
@@ -1078,7 +1083,7 @@
                 <a:ea typeface="Aptos"/>
                 <a:cs typeface="Aptos"/>
               </a:rPr>
-              <a:t> bietet·         Ermutigen Sie die Testversion und den Kauf von Chai-Tee über verschiedene Kanäle und Anreize</a:t>
+              <a:t>· Ermutigung zum Ausprobieren und Kaufen von Chai-Tee über verschiedene Vertriebskanäle</a:t>
             </a:r>
             <a:r>
               <a:rPr sz="1200"/>
@@ -1095,7 +1100,7 @@
                 <a:ea typeface="Aptos"/>
                 <a:cs typeface="Aptos"/>
               </a:rPr>
-              <a:t>·         Bauen Sie Loyalität und Aufbewahrung zwischen Chai-Tee-Verbrauchern durch Engagement und Feedback</a:t>
+              <a:t>· Aufbau von Treue und Bindung der Chai-Tee-Verbrauchenden durch Engagement und Feedback</a:t>
             </a:r>
             <a:r>
               <a:rPr sz="1200"/>
@@ -1112,7 +1117,7 @@
                 <a:ea typeface="Aptos"/>
                 <a:cs typeface="Aptos"/>
               </a:rPr>
-              <a:t>. Der Promotionsplan und die Strategie für Chai-Tee in Lateinamerika werden eine Kombination aus Taktiken wie:</a:t>
+              <a:t>Werbeplan und  und -strategie für Chai-Tee in Lateinamerika werden sich einer Kombination von Taktiken bedienen, wie etwa:</a:t>
             </a:r>
             <a:r>
               <a:rPr sz="1200"/>
@@ -1129,7 +1134,7 @@
                 <a:ea typeface="Aptos"/>
                 <a:cs typeface="Aptos"/>
               </a:rPr>
-              <a:t>·         Erstellen eines catchy und unvergesslichen Markennamens und Logos für Chai-Tee</a:t>
+              <a:t>· Erstellung eines attraktiven und unvergesslichen Markennamens und Logos für Chai-Tee</a:t>
             </a:r>
             <a:r>
               <a:rPr sz="1200"/>
@@ -1146,7 +1151,7 @@
                 <a:ea typeface="Aptos"/>
                 <a:cs typeface="Aptos"/>
               </a:rPr>
-              <a:t>·         Entwicklung einer Website und Social Media Präsenz für Chai-Tee, die seine Vorteile, Features und Geschichten</a:t>
+              <a:t>· Entwicklung einer Website und Präsenz in den sozialen Medien für Chai-Tee, um seine Vorteile, Eigenschaften und Geschichten zu präsentieren</a:t>
             </a:r>
             <a:r>
               <a:rPr sz="1200"/>
@@ -1163,7 +1168,7 @@
                 <a:ea typeface="Aptos"/>
                 <a:cs typeface="Aptos"/>
               </a:rPr>
-              <a:t> zeigt·         Einführung einer digitalen Marketingkampagne, die SEO, SEM, E-Mail-Marketing und Influencer-Marketing verwendet, um potenzielle Kunden</a:t>
+              <a:t>· Einführung einer digitalen Marketingkampagne, die SEO, SEM, E-Mail-Marketing und Influencer-Marketing verwendet, um potenzielle Kundinnen und Kunden zu erreichen und zu gewinnen</a:t>
             </a:r>
             <a:r>
               <a:rPr sz="1200"/>
@@ -1180,7 +1185,7 @@
                 <a:ea typeface="Aptos"/>
                 <a:cs typeface="Aptos"/>
               </a:rPr>
-              <a:t> zu erreichen und zu gewinnen·         Verteilen kostenloser Proben und Coupons von Chai-Tee an strategischen Standorten, wie Supermärkten, Cafés und Gesundheitsgeschäften</a:t>
+              <a:t>· Verteilung kostenloser Proben und Coupons für Chai-Tee an strategischen Standorten wie Supermärkten, Cafés und Gesundheitsgeschäften</a:t>
             </a:r>
             <a:r>
               <a:rPr sz="1200"/>
@@ -1197,7 +1202,7 @@
                 <a:ea typeface="Aptos"/>
                 <a:cs typeface="Aptos"/>
               </a:rPr>
-              <a:t>·         Organisieren von Veranstaltungen und Wettbewerben, die Personen einladen, Chai-Tee mit ihren Freunden und der Familie</a:t>
+              <a:t>· Organisation von Veranstaltungen und Wettbewerben, bei denen Personen eingeladen werden, Chai-Tee mit ihren Freunden und der Familie zu probieren</a:t>
             </a:r>
             <a:r>
               <a:rPr sz="1200"/>
@@ -1214,7 +1219,7 @@
                 <a:ea typeface="Aptos"/>
                 <a:cs typeface="Aptos"/>
               </a:rPr>
-              <a:t> zu teilen·         Die Zusammenarbeit mit lokalen Unternehmen und Organisationen, die die gleichen Werte und Visionen wie Chai Tea</a:t>
+              <a:t>· Zusammenarbeit mit lokalen Unternehmen und Organisationen, deren Werte und Visionen mit Chai-Tee im Einklang stehen</a:t>
             </a:r>
             <a:r>
               <a:rPr sz="1200"/>
@@ -1231,7 +1236,7 @@
                 <a:ea typeface="Aptos"/>
                 <a:cs typeface="Aptos"/>
               </a:rPr>
-              <a:t>teilen, der Promotionsplan und die Strategie für Chai-Tee in Lateinamerika werden über einen Zeitraum von 12 Monaten mit einem Budget von 100.000 US-Dollar implementiert.</a:t>
+              <a:t>Werbeplan und -strategie für Chai-Tee in Lateinamerika werden über einen Zeitraum von 12 Monaten mit einem Budget von 100.000 US-Dollar umgesetzt.</a:t>
             </a:r>
             <a:r>
               <a:rPr lang="de-DE" sz="1200" b="0" i="0" strike="noStrike" cap="none" baseline="0">
@@ -1255,7 +1260,12 @@
                 <a:ea typeface="Aptos"/>
                 <a:cs typeface="Aptos"/>
               </a:rPr>
-              <a:t>Der Plan wird anhand von Leistungsindikatoren wie Website-Datenverkehr, Social-Media-Engagement, E-Mail-Öffnungsraten, Konversionsraten, Umsatzvolumen, Kundenzufriedenheit und Kundenbindungsraten überwacht und bewertet.</a:t>
+              <a:t>Der Plan wird anhand von Leistungsindikatoren wie Website-Datenverkehr, Engagement in sozialen Medien, E-Mail-Öffnungsraten, Konversionsraten, Umsatzvolumen, Kundenzufriedenheit und Kundenbindungsraten überwacht und bewertet.</a:t>
+            </a:r>
+            <a:r>
+              <a:rPr sz="1200"/>
+              <a:t>
+</a:t>
             </a:r>
           </a:p>
         </p:txBody>
@@ -1348,7 +1358,7 @@
                 <a:ea typeface="Aptos"/>
                 <a:cs typeface="Aptos"/>
               </a:rPr>
-              <a:t>Der Promotionsplan und die Strategie für Chai-Tee in Lateinamerika werden voraussichtlich zu einem 20%igen Anstieg des Bewusstseins und des Interesses, einer Steigerung des Marktanteils von 10 %, einer Steigerung des Umsatzes und des Umsatzes von 15 % und einer Steigerung der Kundenzufriedenheit und -aufbewahrungsraten führen.</a:t>
+              <a:t>Der Absatzförderungsplan und die Strategie für Chai-Tee in Lateinamerika werden voraussichtlich zu einem 20%igen Anstieg des Bewusstseins und des Interesses um 20 %, zum Wachstum des Marktanteils um 10 %, zur Erhöhung des Volumens und einer Umsatzsteigerung um 15 % und einer höheren Kundenzufriedenheit und Bindungsrate führen.</a:t>
             </a:r>
             <a:r>
               <a:rPr sz="1200"/>
@@ -1409,7 +1419,7 @@
                 <a:ea typeface="Aptos"/>
                 <a:cs typeface="Aptos"/>
               </a:rPr>
-              <a:t>Die erwarteten Ergebnisse des Promotionsplans und der Strategie für Chai-Tee in Lateinamerika sind:</a:t>
+              <a:t>Die erwarteten Ergebnisse des Werbeplans und der Werbestrategie für Chai-Tee in Lateinamerika:</a:t>
             </a:r>
             <a:r>
               <a:rPr sz="1200"/>
@@ -1426,7 +1436,7 @@
                 <a:ea typeface="Aptos"/>
                 <a:cs typeface="Aptos"/>
               </a:rPr>
-              <a:t>·         Ein Anstieg des Bewusstseins und des Interesses an Chai-Tee unter der Zielgruppe</a:t>
+              <a:t>· Ein Anstieg des Bewusstseins für und des Interesses an Chai-Tee in der Zielgruppe um 20 %</a:t>
             </a:r>
             <a:r>
               <a:rPr sz="1200"/>
@@ -1443,7 +1453,7 @@
                 <a:ea typeface="Aptos"/>
                 <a:cs typeface="Aptos"/>
               </a:rPr>
-              <a:t> um 20 %         Ein Anstieg des Marktanteils von Chai-Tee in der Region</a:t>
+              <a:t>· Ein Anstieg des Marktanteils von Chai-Tee in der Region um 10 %</a:t>
             </a:r>
             <a:r>
               <a:rPr sz="1200"/>
@@ -1460,7 +1470,7 @@
                 <a:ea typeface="Aptos"/>
                 <a:cs typeface="Aptos"/>
               </a:rPr>
-              <a:t> um 10 % ·         Eine Steigerung des Umsatzes und des Umsatzes von Chai-Tee in der Region</a:t>
+              <a:t>· Eine Steigerung des Umsatzvolumens und des Umsatzerlöses von Chai-Tee in der Region um 15 %</a:t>
             </a:r>
             <a:r>
               <a:rPr sz="1200"/>
@@ -1477,7 +1487,7 @@
                 <a:ea typeface="Aptos"/>
                 <a:cs typeface="Aptos"/>
               </a:rPr>
-              <a:t> um 15 % ·         25% Steigerung der Kundenzufriedenheit und Aufbewahrungsraten von Chai-Tee in der Region</a:t>
+              <a:t>· Höhere Kundenzufriedenheits- und Kundenbindungsraten für Chai-Tee in der Region</a:t>
             </a:r>
             <a:r>
               <a:rPr sz="1200"/>
@@ -1575,7 +1585,7 @@
                 <a:ea typeface="Aptos"/>
                 <a:cs typeface="Aptos"/>
               </a:rPr>
-              <a:t>Der Promotionsplan und die Strategie für Chai-Tee in Lateinamerika stehen vor mehreren Herausforderungen, darunter hoher Preis, Mangelndes Bewusstsein, Wettbewerb von anderen Teeprodukten, regulatorischen und kulturellen Hindernissen sowie umweltpolitische und soziale Fragen, die sich auf die Versorgung und Qualität von Chai-Teezutaten auswirken können.</a:t>
+              <a:t>Der Absatzförderungsplan und die Strategie für Chai-Tee in Lateinamerika stehen vor mehreren Herausforderungen, darunter hoher Preis, mangelndes Bewusstsein, Wettbewerb anderer Teeprodukte, regulatorische und kulturelle Hindernissen sowie umweltpolitische und soziale Fragen, die sich auf die Versorgung und Qualität von Chai-Teezutaten auswirken.</a:t>
             </a:r>
             <a:r>
               <a:rPr sz="1200"/>
@@ -1619,7 +1629,7 @@
                 <a:ea typeface="Aptos"/>
                 <a:cs typeface="Aptos"/>
               </a:rPr>
-              <a:t>Die potenziellen Herausforderungen des Promotionsplans und der Strategie für Chai-Tee in Lateinamerika sind:</a:t>
+              <a:t>Die potenziellen Herausforderungen des Promotionsplans und der Strategie für Chai-Tee in Lateinamerika:</a:t>
             </a:r>
             <a:r>
               <a:rPr sz="1200"/>
@@ -1636,7 +1646,7 @@
                 <a:ea typeface="Aptos"/>
                 <a:cs typeface="Aptos"/>
               </a:rPr>
-              <a:t>·         Der hohe Preis und niedrige Erschwinglichkeit von Chai-Teeprodukten im Vergleich zu anderen Getränken</a:t>
+              <a:t> Der hohe und kaum erschwingliche Preis von Chai-Tee-Produkten im Vergleich zu anderen Getränken</a:t>
             </a:r>
             <a:r>
               <a:rPr sz="1200"/>
@@ -1653,7 +1663,7 @@
                 <a:ea typeface="Aptos"/>
                 <a:cs typeface="Aptos"/>
               </a:rPr>
-              <a:t>·         Der Mangel an Bewusstsein und Vertrautheit mit Chai-Tee unter einigen Segmenten der Bevölkerung</a:t>
+              <a:t>·Ein Mangel an Bewusstsein und Vertrautheit mit Chai-Tee in einigen Zielgruppen der Bevölkerung</a:t>
             </a:r>
             <a:r>
               <a:rPr sz="1200"/>
@@ -1670,7 +1680,7 @@
                 <a:ea typeface="Aptos"/>
                 <a:cs typeface="Aptos"/>
               </a:rPr>
-              <a:t>·         Der Wettbewerb gegen andere Teeprodukte wie Kräuter-, Grün- und Schwarztees</a:t>
+              <a:t>·Der Wettbewerb durch andere Teeprodukte wie Kräuter-, Grün- und Schwarztees</a:t>
             </a:r>
             <a:r>
               <a:rPr sz="1200"/>
@@ -1687,7 +1697,7 @@
                 <a:ea typeface="Aptos"/>
                 <a:cs typeface="Aptos"/>
               </a:rPr>
-              <a:t>·         Die regulatorischen und kulturellen Hindernisse, die den Eintritt und die Expansion von Chai-Teeprodukten in einigen Ländern</a:t>
+              <a:t> Regulatorische und kulturelle Hindernisse, die den Eintritt und die Expansion von Chai-Tee-Produkten in einigen Ländern einschränken</a:t>
             </a:r>
             <a:r>
               <a:rPr sz="1200"/>
@@ -1704,7 +1714,7 @@
                 <a:ea typeface="Aptos"/>
                 <a:cs typeface="Aptos"/>
               </a:rPr>
-              <a:t> einschränken können·         Die Umwelt- und Sozialfragen, die sich auf die Versorgung und Qualität von Chai-Teezutaten auswirken können</a:t>
+              <a:t>Umweltbelange und soziale Fragen, die sich auf die Versorgung und Qualität von Chai-Teezutaten auswirken</a:t>
             </a:r>
             <a:r>
               <a:rPr sz="1200"/>
@@ -1850,7 +1860,7 @@
                 <a:ea typeface="Aptos"/>
                 <a:cs typeface="Aptos"/>
               </a:rPr>
-              <a:t>Eine Mischung aus Online- und Offline-Taktiken sollte verwendet werden, um die Zielgruppe zu erreichen und Herausforderungen zu überwinden.</a:t>
+              <a:t>Es sollte eine Mischung aus Online- und Offline-Taktiken verwendet werden, um die Zielgruppe zu erreichen und die Herausforderungen zu meistern.</a:t>
             </a:r>
             <a:r>
               <a:rPr sz="1200"/>
@@ -1894,7 +1904,7 @@
                 <a:ea typeface="Aptos"/>
                 <a:cs typeface="Aptos"/>
               </a:rPr>
-              <a:t>Empfehlungen und Schlussfolgerungen basierend auf der Marktanalyse, der Wettbewerbsanalyse, den Vertriebskanälen und dem Promotionsplan und der Strategie können die folgenden Empfehlungen und Schlussfolgerungen</a:t>
+              <a:t>Empfehlungen und Schlussfolgerungen</a:t>
             </a:r>
             <a:r>
               <a:rPr sz="1200"/>
@@ -1911,7 +1921,7 @@
                 <a:ea typeface="Aptos"/>
                 <a:cs typeface="Aptos"/>
               </a:rPr>
-              <a:t>für die Zukunft von Chai-Tee in Lateinamerika gezogen werden:</a:t>
+              <a:t>Basierend auf der Marktanalyse, der Wettbewerbsanalyse, den Vertriebskanälen sowie dem Werbeplan und der Werbestrategie können die folgenden Empfehlungen gegeben und Schlussfolgerungen in Bezug auf die Zukunft von Chai-Tee in Lateinamerika gezogen werden:</a:t>
             </a:r>
             <a:r>
               <a:rPr sz="1200"/>
@@ -1928,7 +1938,7 @@
                 <a:ea typeface="Aptos"/>
                 <a:cs typeface="Aptos"/>
               </a:rPr>
-              <a:t>·         Chai-Tee ist ein vielversprechendes Produkt, das im lateinamerikanischen Markt wachsen und erfolgreich sein kann, da es eine gesunde, natürliche und exotische Alternative zu anderen Getränken</a:t>
+              <a:t>· Chai-Tee ist ein vielversprechendes Produkt, das im lateinamerikanischen Markt wachsen und erfolgreich sein kann, weil er eine gesunde, natürliche und exotische Alternative zu anderen Getränken darstellt</a:t>
             </a:r>
             <a:r>
               <a:rPr sz="1200"/>
@@ -1945,7 +1955,7 @@
                 <a:ea typeface="Aptos"/>
                 <a:cs typeface="Aptos"/>
               </a:rPr>
-              <a:t> bietet·         Chai-Tee muss als Premium-, authentisches und vielseitiges Produkt positioniert und vermarktet werden, das verschiedene Segmente und Anlässe</a:t>
+              <a:t>· Chai-Tee muss als authentisches und vielseitiges Premiumprodukt positioniert und vermarktet werden, das für  verschiedene Zielgruppen und Anlässe attraktiv sein kann</a:t>
             </a:r>
             <a:r>
               <a:rPr sz="1200"/>
@@ -1962,7 +1972,7 @@
                 <a:ea typeface="Aptos"/>
                 <a:cs typeface="Aptos"/>
               </a:rPr>
-              <a:t> ansprechen kann·         Chai-Tee muss seine einzigartigen Merkmale und Vorteile nutzen, wie z. B. sein reichhaltiges Aroma, seinen Geschmack und seine gesundheitlichen Vorteile, um sich von anderen Teeprodukten</a:t>
+              <a:t>· Chai-Tee muss seine einzigartigen Merkmale und Vorteile nutzen, wie etwa sein reichhaltiges Aroma, seinen Geschmack und seine gesundheitlichen Vorteile, um sich von anderen Teeprodukten abzuheben</a:t>
             </a:r>
             <a:r>
               <a:rPr sz="1200"/>
@@ -1979,7 +1989,7 @@
                 <a:ea typeface="Aptos"/>
                 <a:cs typeface="Aptos"/>
               </a:rPr>
-              <a:t> zu unterscheiden·         Chai-Tee muss eine Mischung aus Online- und Offline-Taktiken verwenden, um die Zielgruppe zu erreichen und zu interagieren und eine loyale und zufriedene Kundenbasis</a:t>
+              <a:t>· Chai-Tee muss eine Kombination aus Online- und Offline-Taktiken verwenden, um die Zielgruppe zu erreichen, mit ihr zu interagieren und eine treue und zufriedene Kundenbasis zu schaffen</a:t>
             </a:r>
             <a:r>
               <a:rPr sz="1200"/>
@@ -1996,7 +2006,7 @@
                 <a:ea typeface="Aptos"/>
                 <a:cs typeface="Aptos"/>
               </a:rPr>
-              <a:t> zu schaffen·         Chai-Tee muss die Herausforderungen und Bedrohungen überwinden, die sein Wachstum und seine Expansion in der Region behindern können, wie z. B. Preis, Bewusstsein, Wettbewerb, Regulierung und Nachhaltigkeit</a:t>
+              <a:t>· Chai-Tee muss die Herausforderungen und Bedrohungen meistern, die sein Wachstum und seine Expansion in der Region behindern könnten, wie etwa Preis, Bewusstsein, Wettbewerb, Regulierung und Nachhaltigkeit</a:t>
             </a:r>
             <a:r>
               <a:rPr sz="1200"/>
@@ -2013,7 +2023,7 @@
                 <a:ea typeface="Aptos"/>
                 <a:cs typeface="Aptos"/>
               </a:rPr>
-              <a:t>Abschließend ist Chai Tee ein Produkt, das viel Potenzial und Chancen auf dem lateinamerikanischen Markt hat, aber auch einige Herausforderungen und Risiken konfrontiert.</a:t>
+              <a:t>Abschließend ist festzustellen, dass Chai-Tee ein Produkt ist, das hohes Potenzial und große Chancen auf dem lateinamerikanischen Markt hat, aber auch mit bestimmten Herausforderungen und Risiken konfrontiert ist.</a:t>
             </a:r>
             <a:r>
               <a:rPr lang="de-DE" sz="1200" b="0" i="0" strike="noStrike" cap="none" baseline="0">
@@ -2062,6 +2072,11 @@
                 <a:cs typeface="Aptos"/>
               </a:rPr>
               <a:t>Der Absatzförderungsplan und die Strategie müssen jedoch ständig überwacht, bewertet und entsprechend den sich ändernden Marktbedingungen und dem Kundenfeedback angepasst werden.</a:t>
+            </a:r>
+            <a:r>
+              <a:rPr sz="1200"/>
+              <a:t>
+</a:t>
             </a:r>
           </a:p>
         </p:txBody>
@@ -2312,7 +2327,7 @@
                 <a:ea typeface="Aptos"/>
                 <a:cs typeface="Aptos"/>
               </a:rPr>
-              <a:t> * David es Tea</a:t>
+              <a:t> * David's Tea</a:t>
             </a:r>
             <a:r>
               <a:rPr sz="1200"/>
@@ -2380,7 +2395,7 @@
                 <a:ea typeface="Aptos"/>
                 <a:cs typeface="Aptos"/>
               </a:rPr>
-              <a:t> * Händler</a:t>
+              <a:t> * Einzelhändler</a:t>
             </a:r>
             <a:r>
               <a:rPr sz="1200"/>
@@ -2397,7 +2412,7 @@
                 <a:ea typeface="Aptos"/>
                 <a:cs typeface="Aptos"/>
               </a:rPr>
-              <a:t> * Händler * Händler * Vertriebskanäle * Distributoren</a:t>
+              <a:t> * Großhändler</a:t>
             </a:r>
             <a:r>
               <a:rPr sz="1200"/>
@@ -2414,7 +2429,7 @@
                 <a:ea typeface="Aptos"/>
                 <a:cs typeface="Aptos"/>
               </a:rPr>
-              <a:t> * Vertriebspläne</a:t>
+              <a:t> * Vertriebskanäle </a:t>
             </a:r>
             <a:r>
               <a:rPr sz="1200"/>
@@ -2431,7 +2446,7 @@
                 <a:ea typeface="Aptos"/>
                 <a:cs typeface="Aptos"/>
               </a:rPr>
-              <a:t> und -strategie</a:t>
+              <a:t> * Absatzförderungsplan und Strategie</a:t>
             </a:r>
             <a:r>
               <a:rPr sz="1200"/>
@@ -2465,7 +2480,7 @@
                 <a:ea typeface="Aptos"/>
                 <a:cs typeface="Aptos"/>
               </a:rPr>
-              <a:t> * Erwartete Ergebnisse * Erwartete Ergebnisse</a:t>
+              <a:t> * Erwartete Ergebnisse</a:t>
             </a:r>
             <a:r>
               <a:rPr sz="1200"/>
@@ -2648,7 +2663,7 @@
                 <a:ea typeface="Aptos"/>
                 <a:cs typeface="Aptos"/>
               </a:rPr>
-              <a:t>Original Content:</a:t>
+              <a:t>Originalinhalt:</a:t>
             </a:r>
             <a:r>
               <a:rPr sz="1200"/>
@@ -2665,7 +2680,7 @@
                 <a:ea typeface="Aptos"/>
                 <a:cs typeface="Aptos"/>
               </a:rPr>
-              <a:t>Introductions</a:t>
+              <a:t>Einführung</a:t>
             </a:r>
             <a:r>
               <a:rPr sz="1200"/>
@@ -2682,7 +2697,7 @@
                 <a:ea typeface="Aptos"/>
                 <a:cs typeface="Aptos"/>
               </a:rPr>
-              <a:t>Mystic Spice Premium Chai Tea ist ein neues Produkt von Contoso Beverage, einem Unternehmen, das sich auf die Herstellung und Verteilung hochwertiger Getränke auf der ganzen Welt spezialisiert hat.</a:t>
+              <a:t>Mystic Spice Premium Chai Tea ist ein neues Produkt, das von Contoso Beverage auf den Markt gebracht wurde, einem Unternehmen, das sich auf die Herstellung und den Vertrieb von hochwertigen Getränken weltweit spezialisiert hat.</a:t>
             </a:r>
             <a:r>
               <a:rPr lang="de-DE" sz="1200" b="0" i="0" strike="noStrike" cap="none" baseline="0">
@@ -2779,42 +2794,6 @@
                 <a:cs typeface="Aptos"/>
               </a:rPr>
               <a:t>Er hat auch eine reiche kulturelle und historische Bedeutung, da er oft mit Gastfreundschaft, Freundschaft und Entspannung assoziiert wird.</a:t>
-            </a:r>
-            <a:r>
-              <a:rPr lang="de-DE" sz="1200" b="0" i="0" strike="noStrike" cap="none" baseline="0">
-                <a:solidFill>
-                  <a:srgbClr val="000000"/>
-                </a:solidFill>
-                <a:effectLst/>
-                <a:latin typeface="Aptos"/>
-                <a:ea typeface="Aptos"/>
-                <a:cs typeface="Aptos"/>
-              </a:rPr>
-              <a:t>Ziel dieses Berichts ist es, eine Marktanalyse für Mystic Spice Premium Chai Tea mit Fokus auf die Region Lateinamerika zu erstellen.</a:t>
-            </a:r>
-            <a:r>
-              <a:rPr lang="de-DE" sz="1200" b="0" i="0" strike="noStrike" cap="none" baseline="0">
-                <a:solidFill>
-                  <a:srgbClr val="000000"/>
-                </a:solidFill>
-                <a:effectLst/>
-                <a:latin typeface="Aptos"/>
-                <a:ea typeface="Aptos"/>
-                <a:cs typeface="Aptos"/>
-              </a:rPr>
-              <a:t> </a:t>
-            </a:r>
-            <a:r>
-              <a:rPr lang="de-DE" sz="1200" b="0" i="0" strike="noStrike" cap="none" baseline="0">
-                <a:solidFill>
-                  <a:srgbClr val="000000"/>
-                </a:solidFill>
-                <a:effectLst/>
-                <a:latin typeface="Aptos"/>
-                <a:ea typeface="Aptos"/>
-                <a:cs typeface="Aptos"/>
-              </a:rPr>
-              <a:t>Der Bericht wird die folgenden Aspekte abdecken:</a:t>
             </a:r>
             <a:r>
               <a:rPr sz="1200"/>
@@ -2831,7 +2810,31 @@
                 <a:ea typeface="Aptos"/>
                 <a:cs typeface="Aptos"/>
               </a:rPr>
-              <a:t>·         Die Produktbeschreibung, Features und Vorteile von Mystic Spice Premium Chai Tea</a:t>
+              <a:t>Ziel dieses Berichts ist es, eine Marktanalyse für Mystic Spice Premium Chai Tea mit Fokus auf die Region Lateinamerika zu erstellen.</a:t>
+            </a:r>
+            <a:r>
+              <a:rPr lang="de-DE" sz="1200" b="0" i="0" strike="noStrike" cap="none" baseline="0">
+                <a:solidFill>
+                  <a:srgbClr val="000000"/>
+                </a:solidFill>
+                <a:effectLst/>
+                <a:latin typeface="Aptos"/>
+                <a:ea typeface="Aptos"/>
+                <a:cs typeface="Aptos"/>
+              </a:rPr>
+              <a:t> </a:t>
+            </a:r>
+            <a:r>
+              <a:rPr lang="de-DE" sz="1200" b="0" i="0" strike="noStrike" cap="none" baseline="0">
+                <a:solidFill>
+                  <a:srgbClr val="000000"/>
+                </a:solidFill>
+                <a:effectLst/>
+                <a:latin typeface="Aptos"/>
+                <a:ea typeface="Aptos"/>
+                <a:cs typeface="Aptos"/>
+              </a:rPr>
+              <a:t>Der Bericht wird die folgenden Aspekte abdecken:</a:t>
             </a:r>
             <a:r>
               <a:rPr sz="1200"/>
@@ -2848,7 +2851,7 @@
                 <a:ea typeface="Aptos"/>
                 <a:cs typeface="Aptos"/>
               </a:rPr>
-              <a:t>·         Markttrend und Nachfrage nach Chai-Tee in Lateinamerika</a:t>
+              <a:t>·         Produktbeschreibung, Merkmale und Vorteile von Mystic Spice Premium Chai Tea</a:t>
             </a:r>
             <a:r>
               <a:rPr sz="1200"/>
@@ -2865,7 +2868,7 @@
                 <a:ea typeface="Aptos"/>
                 <a:cs typeface="Aptos"/>
               </a:rPr>
-              <a:t>·         Die Wettbewerbsanalyse von Chai-Tee in Lateinamerika</a:t>
+              <a:t>·          Markttrend und Nachfrage nach Chai-Tee in Lateinamerika</a:t>
             </a:r>
             <a:r>
               <a:rPr sz="1200"/>
@@ -2882,7 +2885,7 @@
                 <a:ea typeface="Aptos"/>
                 <a:cs typeface="Aptos"/>
               </a:rPr>
-              <a:t>·         Die Vertriebskanäle für Chai-Tee in Lateinamerika</a:t>
+              <a:t>··        Wettbewerbsanalyse von Chai-Tee in Lateinamerika</a:t>
             </a:r>
             <a:r>
               <a:rPr sz="1200"/>
@@ -2899,7 +2902,7 @@
                 <a:ea typeface="Aptos"/>
                 <a:cs typeface="Aptos"/>
               </a:rPr>
-              <a:t>·         Der Promotionsplan und die Strategie für Chai-Tee in Lateinamerika</a:t>
+              <a:t>·          Vertriebskanäle von Chai-Tee in Lateinamerika</a:t>
             </a:r>
             <a:r>
               <a:rPr sz="1200"/>
@@ -2916,7 +2919,7 @@
                 <a:ea typeface="Aptos"/>
                 <a:cs typeface="Aptos"/>
               </a:rPr>
-              <a:t>·         Die erwarteten Ergebnisse und Herausforderungen des Förderplans</a:t>
+              <a:t>·         Absatzförderungsplan und die Strategie für Chai-Tee in Lateinamerika</a:t>
             </a:r>
             <a:r>
               <a:rPr sz="1200"/>
@@ -2933,7 +2936,24 @@
                 <a:ea typeface="Aptos"/>
                 <a:cs typeface="Aptos"/>
               </a:rPr>
-              <a:t>·         Die Empfehlungen und Schlussfolgerungen für die Zukunft von Chai-Tee in Lateinamerika</a:t>
+              <a:t>··        Erwartete Ergebnisse und Herausforderungen des Absatzförderungsplans</a:t>
+            </a:r>
+            <a:r>
+              <a:rPr sz="1200"/>
+              <a:t>
+</a:t>
+            </a:r>
+            <a:r>
+              <a:rPr lang="de-DE" sz="1200" b="0" i="0" strike="noStrike" cap="none" baseline="0">
+                <a:solidFill>
+                  <a:srgbClr val="000000"/>
+                </a:solidFill>
+                <a:effectLst/>
+                <a:latin typeface="Aptos"/>
+                <a:ea typeface="Aptos"/>
+                <a:cs typeface="Aptos"/>
+              </a:rPr>
+              <a:t>·         Empfehlungen und Schlussfolgerungen für die Zukunft von Chai-Tee in Lateinamerika</a:t>
             </a:r>
             <a:r>
               <a:rPr sz="1200"/>
@@ -3055,7 +3075,7 @@
                 <a:ea typeface="Aptos"/>
                 <a:cs typeface="Aptos"/>
               </a:rPr>
-              <a:t>Jede Tasse bringt Sie auf eine Reise durch die lebhaften Landschaften Indiens und bringt Ihnen ein authentisches Chai-Erlebnis zu Ihrem Zuhause.</a:t>
+              <a:t>Jede Tasse Chai-Tee ist wie eine bezaubernde Reise durch die pulsierenden Landschaften Indiens und  authentischer Chai-Genuss bei Ihnen zu Hause..</a:t>
             </a:r>
             <a:r>
               <a:rPr sz="1200"/>
@@ -3082,7 +3102,7 @@
                 <a:ea typeface="Aptos"/>
                 <a:cs typeface="Aptos"/>
               </a:rPr>
-              <a:t>Original Content:</a:t>
+              <a:t>Originalinhalt::</a:t>
             </a:r>
             <a:r>
               <a:rPr sz="1200"/>
@@ -3116,7 +3136,7 @@
                 <a:ea typeface="Aptos"/>
                 <a:cs typeface="Aptos"/>
               </a:rPr>
-              <a:t>Mystic Spice Premium Chai Tea ist eine sorgfältig gestaltete Mischung, die den zeitlosen Traditionen der indischen Chai huldigt.</a:t>
+              <a:t>Mystic Spice Premium Chai Tea ist eine sorgfältig hergestellte Mischung und eine Hommage an die zeitlosen Traditionen des indischen Chai.</a:t>
             </a:r>
             <a:r>
               <a:rPr lang="de-DE" sz="1200" b="0" i="0" strike="noStrike" cap="none" baseline="0">
@@ -3164,7 +3184,12 @@
                 <a:ea typeface="Aptos"/>
                 <a:cs typeface="Aptos"/>
               </a:rPr>
-              <a:t>Die Produktbeschreibung, die Merkmale und der Nutzen von Mystic Spice Premium Chai Tea sind in der folgenden Tabelle zusammengefasst:</a:t>
+              <a:t>Die Produktbeschreibung, die Merkmale und die Vorteile von Mystic Spice Premium Chai Tea sind in der folgenden Tabelle zusammengefasst:</a:t>
+            </a:r>
+            <a:r>
+              <a:rPr sz="1200"/>
+              <a:t>
+</a:t>
             </a:r>
           </a:p>
         </p:txBody>
@@ -3491,7 +3516,7 @@
                 <a:ea typeface="Aptos"/>
                 <a:cs typeface="Aptos"/>
               </a:rPr>
-              <a:t>Zu den Haupttreibern des Wachstums gehören die Erhöhung des Bewusstseins, das steigende verfügbare Einkommen und die wachsende Verteilung.</a:t>
+              <a:t>Zu den wichtigsten Wachstumstreibern gehören das zunehmende Bewusstsein, steigendes Einkommen und die Ausweitung des Vertriebs.</a:t>
             </a:r>
             <a:r>
               <a:rPr sz="1200"/>
@@ -3518,7 +3543,7 @@
                 <a:ea typeface="Aptos"/>
                 <a:cs typeface="Aptos"/>
               </a:rPr>
-              <a:t>Original Content:</a:t>
+              <a:t>Originalinhalt:</a:t>
             </a:r>
             <a:r>
               <a:rPr sz="1200"/>
@@ -3535,7 +3560,7 @@
                 <a:ea typeface="Aptos"/>
                 <a:cs typeface="Aptos"/>
               </a:rPr>
-              <a:t>Market Trend and Demand</a:t>
+              <a:t>Markttrend und Nachfrage</a:t>
             </a:r>
             <a:r>
               <a:rPr sz="1200"/>
@@ -3552,7 +3577,7 @@
                 <a:ea typeface="Aptos"/>
                 <a:cs typeface="Aptos"/>
               </a:rPr>
-              <a:t>Der lateinamerikanische Markt bietet eine großartige Gelegenheit für Chai-Tee, da die Region eine wachsende Nachfrage nach gesunden, natürlichen und exotischen Produkten hat.</a:t>
+              <a:t>Der lateinamerikanische Markt bietet eine große Chance für Chai-Tee, denn die Region verzeichnet eine wachsende Nachfrage nach gesunden, natürlichen und exotischen Produkten.</a:t>
             </a:r>
             <a:r>
               <a:rPr lang="de-DE" sz="1200" b="0" i="0" strike="noStrike" cap="none" baseline="0">
@@ -3625,66 +3650,6 @@
                 <a:cs typeface="Aptos"/>
               </a:rPr>
               <a:t>Chai-Tee passt auch zum Lebensstil und zu den Vorlieben der Bevölkerung in Lateinamerika, in der geselliges Beisammensein und der Konsum süßer Leckereien nichts Ungewöhnliches sind.</a:t>
-            </a:r>
-            <a:r>
-              <a:rPr lang="de-DE" sz="1200" b="0" i="0" strike="noStrike" cap="none" baseline="0">
-                <a:solidFill>
-                  <a:srgbClr val="000000"/>
-                </a:solidFill>
-                <a:effectLst/>
-                <a:latin typeface="Aptos"/>
-                <a:ea typeface="Aptos"/>
-                <a:cs typeface="Aptos"/>
-              </a:rPr>
-              <a:t>Laut einem Bericht von Grand View Research wurde der globale Chai-Tee-Markt im Jahr 2019 auf 1,9 Mrd. USD geschätzt und wird voraussichtlich von 2020 bis 2027 mit einer durchschnittlichen jährlichen Wachstumsrate (CAGR) von 5,5 % wachsen.</a:t>
-            </a:r>
-            <a:r>
-              <a:rPr lang="de-DE" sz="1200" b="0" i="0" strike="noStrike" cap="none" baseline="0">
-                <a:solidFill>
-                  <a:srgbClr val="000000"/>
-                </a:solidFill>
-                <a:effectLst/>
-                <a:latin typeface="Aptos"/>
-                <a:ea typeface="Aptos"/>
-                <a:cs typeface="Aptos"/>
-              </a:rPr>
-              <a:t> </a:t>
-            </a:r>
-            <a:r>
-              <a:rPr lang="de-DE" sz="1200" b="0" i="0" strike="noStrike" cap="none" baseline="0">
-                <a:solidFill>
-                  <a:srgbClr val="000000"/>
-                </a:solidFill>
-                <a:effectLst/>
-                <a:latin typeface="Aptos"/>
-                <a:ea typeface="Aptos"/>
-                <a:cs typeface="Aptos"/>
-              </a:rPr>
-              <a:t>Der Bericht besagt auch, dass Lateinamerika eine der am schnellsten wachsenden Regionen für Chai-Tee ist, mit einer CAGR von 6,2 % von 2020 bis 2027.</a:t>
-            </a:r>
-            <a:r>
-              <a:rPr lang="de-DE" sz="1200" b="0" i="0" strike="noStrike" cap="none" baseline="0">
-                <a:solidFill>
-                  <a:srgbClr val="000000"/>
-                </a:solidFill>
-                <a:effectLst/>
-                <a:latin typeface="Aptos"/>
-                <a:ea typeface="Aptos"/>
-                <a:cs typeface="Aptos"/>
-              </a:rPr>
-              <a:t> </a:t>
-            </a:r>
-            <a:r>
-              <a:rPr lang="de-DE" sz="1200" b="0" i="0" strike="noStrike" cap="none" baseline="0">
-                <a:solidFill>
-                  <a:srgbClr val="000000"/>
-                </a:solidFill>
-                <a:effectLst/>
-                <a:latin typeface="Aptos"/>
-                <a:ea typeface="Aptos"/>
-                <a:cs typeface="Aptos"/>
-              </a:rPr>
-              <a:t>Die wichtigsten Faktoren für das Wachstum von Chai-Tee in Lateinamerika sind:</a:t>
             </a:r>
             <a:r>
               <a:rPr sz="1200"/>
@@ -3701,7 +3666,55 @@
                 <a:ea typeface="Aptos"/>
                 <a:cs typeface="Aptos"/>
               </a:rPr>
-              <a:t>·         Das zunehmende Bewusstsein und Interesse an den Gesundheitlichen Vorteilen und kulturellen Aspekten von Chai Tea</a:t>
+              <a:t>Laut einem Bericht von Grand View Research wurde der globale Chai-Tee-Markt im Jahr 2019 auf 1,9 Mrd. USD geschätzt und wird voraussichtlich von 2020 bis 2027 mit einer durchschnittlichen jährlichen Wachstumsrate (CAGR) von 5,5 % wachsen.</a:t>
+            </a:r>
+            <a:r>
+              <a:rPr lang="de-DE" sz="1200" b="0" i="0" strike="noStrike" cap="none" baseline="0">
+                <a:solidFill>
+                  <a:srgbClr val="000000"/>
+                </a:solidFill>
+                <a:effectLst/>
+                <a:latin typeface="Aptos"/>
+                <a:ea typeface="Aptos"/>
+                <a:cs typeface="Aptos"/>
+              </a:rPr>
+              <a:t> </a:t>
+            </a:r>
+            <a:r>
+              <a:rPr lang="de-DE" sz="1200" b="0" i="0" strike="noStrike" cap="none" baseline="0">
+                <a:solidFill>
+                  <a:srgbClr val="000000"/>
+                </a:solidFill>
+                <a:effectLst/>
+                <a:latin typeface="Aptos"/>
+                <a:ea typeface="Aptos"/>
+                <a:cs typeface="Aptos"/>
+              </a:rPr>
+              <a:t>Der Bericht besagt auch, dass Lateinamerika eine der am schnellsten wachsenden Regionen für Chai-Tee ist, mit einer CAGR von 6,2 % von 2020 bis 2027.</a:t>
+            </a:r>
+            <a:r>
+              <a:rPr lang="de-DE" sz="1200" b="0" i="0" strike="noStrike" cap="none" baseline="0">
+                <a:solidFill>
+                  <a:srgbClr val="000000"/>
+                </a:solidFill>
+                <a:effectLst/>
+                <a:latin typeface="Aptos"/>
+                <a:ea typeface="Aptos"/>
+                <a:cs typeface="Aptos"/>
+              </a:rPr>
+              <a:t> </a:t>
+            </a:r>
+            <a:r>
+              <a:rPr lang="de-DE" sz="1200" b="0" i="0" strike="noStrike" cap="none" baseline="0">
+                <a:solidFill>
+                  <a:srgbClr val="000000"/>
+                </a:solidFill>
+                <a:effectLst/>
+                <a:latin typeface="Aptos"/>
+                <a:ea typeface="Aptos"/>
+                <a:cs typeface="Aptos"/>
+              </a:rPr>
+              <a:t>Die wichtigsten Faktoren für das Wachstum von Chai-Tee in Lateinamerika:</a:t>
             </a:r>
             <a:r>
               <a:rPr sz="1200"/>
@@ -3718,7 +3731,7 @@
                 <a:ea typeface="Aptos"/>
                 <a:cs typeface="Aptos"/>
               </a:rPr>
-              <a:t>·         Das steigende verfügbare Einkommen und die Ausgabenleistung der Verbraucher</a:t>
+              <a:t>·Das zunehmende Bewusstsein und Interesse an den gesundheitlichen Vorteilen und kulturellen Aspekten von Chai Tea</a:t>
             </a:r>
             <a:r>
               <a:rPr sz="1200"/>
@@ -3735,7 +3748,7 @@
                 <a:ea typeface="Aptos"/>
                 <a:cs typeface="Aptos"/>
               </a:rPr>
-              <a:t> der Mittelschicht·         Die wachsende Beliebtheit von Spezial- und Premium-Tees unter den jüngeren und städtischen Segmenten</a:t>
+              <a:t>·   Wachsende Einkommen und die steigende Kaufkraft der Verbraucher und der Mittelschicht</a:t>
             </a:r>
             <a:r>
               <a:rPr sz="1200"/>
@@ -3752,7 +3765,7 @@
                 <a:ea typeface="Aptos"/>
                 <a:cs typeface="Aptos"/>
               </a:rPr>
-              <a:t>·         Die expandierende Verteilung und Verfügbarkeit von Chai-Teeprodukten in verschiedenen Kanälen, wie Supermärkten, Cafés und Online-Plattformen</a:t>
+              <a:t>      Die zunehmende Beliebtheit von Spezial- und Premium-Tees unter den jüngeren und städtischen Zielgruppen</a:t>
             </a:r>
             <a:r>
               <a:rPr sz="1200"/>
@@ -3769,7 +3782,24 @@
                 <a:ea typeface="Aptos"/>
                 <a:cs typeface="Aptos"/>
               </a:rPr>
-              <a:t>·         Die Entstehung neuer und innovativer Aromen und Formate von Chai-Tee, wie Ready-to-Drink, Instant und Bio-Sorten</a:t>
+              <a:t>·     Der expandierende Vertrieb und das Angebot von Chai-Tee-Produkten über die Vertriebskanäle, wie etwa Supermärkte, Cafés und Online-Plattformen</a:t>
+            </a:r>
+            <a:r>
+              <a:rPr sz="1200"/>
+              <a:t>
+</a:t>
+            </a:r>
+            <a:r>
+              <a:rPr lang="de-DE" sz="1200" b="0" i="0" strike="noStrike" cap="none" baseline="0">
+                <a:solidFill>
+                  <a:srgbClr val="000000"/>
+                </a:solidFill>
+                <a:effectLst/>
+                <a:latin typeface="Aptos"/>
+                <a:ea typeface="Aptos"/>
+                <a:cs typeface="Aptos"/>
+              </a:rPr>
+              <a:t>·     Die Entwicklung neuer und innovativer Aromen und Formate von Chai-Tee, wie etwa Ready-to-Drink, Instant und Bio-Sorten</a:t>
             </a:r>
             <a:r>
               <a:rPr sz="1200"/>
@@ -3939,7 +3969,7 @@
                 <a:ea typeface="Aptos"/>
                 <a:cs typeface="Aptos"/>
               </a:rPr>
-              <a:t>Großhändler verkaufen massenweise an Einzelhändler, während Händler Produkte von Herstellern zu Einzelhändlern transportieren.</a:t>
+              <a:t>Großhändler verkaufen Massengüter an Einzelhändler und die Vertriebshändler liefern und befördern die Produkte von den Herstellern zu den Einzelhändlern.</a:t>
             </a:r>
             <a:r>
               <a:rPr sz="1200"/>
@@ -3966,7 +3996,7 @@
                 <a:ea typeface="Aptos"/>
                 <a:cs typeface="Aptos"/>
               </a:rPr>
-              <a:t>Original Content:</a:t>
+              <a:t>Originalinhalt:</a:t>
             </a:r>
             <a:r>
               <a:rPr sz="1200"/>
@@ -3983,7 +4013,7 @@
                 <a:ea typeface="Aptos"/>
                 <a:cs typeface="Aptos"/>
               </a:rPr>
-              <a:t>Die Vertriebskanäle für Chai-Tee in Lateinamerika sind die Möglichkeiten und Mittel, mit denen Chai-Teeprodukte an die Endverbraucher geliefert und verkauft werden.</a:t>
+              <a:t>Die Vertriebskanäle von Chai-Tee in Lateinamerika sind die Mittel und Wege, über die Chai-Tee-Produkte an die Endverbraucher*innen geliefert und verkauft werden.</a:t>
             </a:r>
             <a:r>
               <a:rPr lang="de-DE" sz="1200" b="0" i="0" strike="noStrike" cap="none" baseline="0">
@@ -4007,7 +4037,12 @@
                 <a:ea typeface="Aptos"/>
                 <a:cs typeface="Aptos"/>
               </a:rPr>
-              <a:t>Die Vertriebskanäle für Chai-Tee in Lateinamerika lassen sich in drei Typen einteilen: Einzelhandel, Großhandel und Vertriebspartner.</a:t>
+              <a:t>Die Vertriebskanäle für Chai-Tee in Lateinamerika lassen sich in drei Typen unterteilen: Einzelhandel, Großhandel und Vertriebspartner.</a:t>
+            </a:r>
+            <a:r>
+              <a:rPr sz="1200"/>
+              <a:t>
+</a:t>
             </a:r>
             <a:r>
               <a:rPr lang="de-DE" sz="1200" b="0" i="0" strike="noStrike" cap="none" baseline="0">
@@ -4092,6 +4127,11 @@
                 <a:cs typeface="Aptos"/>
               </a:rPr>
               <a:t>Zu den wichtigsten Einzelhandelsunternehmen für Chai-Tee-Produkte in Lateinamerika gehören Walmart, Carrefour, Oxxo, Starbucks und Amazon.</a:t>
+            </a:r>
+            <a:r>
+              <a:rPr sz="1200"/>
+              <a:t>
+</a:t>
             </a:r>
           </a:p>
         </p:txBody>
@@ -4232,7 +4272,7 @@
                 <a:ea typeface="Aptos"/>
                 <a:cs typeface="Aptos"/>
               </a:rPr>
-              <a:t>Zu den großen Großhändlern in Lateinamerika gehören Cencosud, Grupo Pao de Acucar, La Anonima und Makro.</a:t>
+              <a:t>Zu den wichtigsten Großhandelsunternehmen von Chai-Tee-Produkten in Lateinamerika gehören Cencosud, Grupo Pão de Açúcar, La Anónima und Makro.</a:t>
             </a:r>
             <a:r>
               <a:rPr sz="1200"/>
@@ -4259,7 +4299,7 @@
                 <a:ea typeface="Aptos"/>
                 <a:cs typeface="Aptos"/>
               </a:rPr>
-              <a:t>Original Content:</a:t>
+              <a:t>Originalinhalt:</a:t>
             </a:r>
             <a:r>
               <a:rPr sz="1200"/>
@@ -4276,7 +4316,7 @@
                 <a:ea typeface="Aptos"/>
                 <a:cs typeface="Aptos"/>
               </a:rPr>
-              <a:t>Wholesalers sind die Unternehmen, die Chai-Teeprodukte in Massen von den Herstellern oder Distributoren kaufen und sie an die Einzelhändler oder andere Vermittler verkaufen.</a:t>
+              <a:t>Großhändler sind die Unternehmen, die Chai-Tee-Produkte als Massengüter von den Herstellern oder Vertriebshändlern kaufen und sie an Einzelhändler oder andere Zwischenhändler verkaufen.</a:t>
             </a:r>
             <a:r>
               <a:rPr lang="de-DE" sz="1200" b="0" i="0" strike="noStrike" cap="none" baseline="0">
@@ -4348,7 +4388,12 @@
                 <a:ea typeface="Aptos"/>
                 <a:cs typeface="Aptos"/>
               </a:rPr>
-              <a:t>Zu den wichtigsten Großhändlern von Chai-Tee-Produkten in Lateinamerika gehören Cencosud, Grupo Pão de Açúcar, La Anónima und Makro.</a:t>
+              <a:t>Zu den wichtigsten Großhandelsunternehmen von Chai-Tee-Produkten in Lateinamerika gehören Cencosud, Grupo Pão de Açúcar, La Anónima und Makro.</a:t>
+            </a:r>
+            <a:r>
+              <a:rPr sz="1200"/>
+              <a:t>
+</a:t>
             </a:r>
           </a:p>
         </p:txBody>
@@ -8606,7 +8651,7 @@
                 <a:ea typeface="Bookman Old Style"/>
                 <a:cs typeface="Bookman Old Style"/>
               </a:rPr>
-              <a:t>Vertriebskanäle: Distributoren</a:t>
+              <a:t>Vertriebskanäle: Vertriebspartner</a:t>
             </a:r>
           </a:p>
         </p:txBody>
@@ -12056,6 +12101,18 @@
                     <a:lstStyle/>
                     <a:p>
                       <a:r>
+                        <a:rPr lang="de-DE" sz="3300" b="1" i="0" strike="noStrike" cap="none" baseline="0">
+                          <a:solidFill>
+                            <a:srgbClr val="FFFFFF"/>
+                          </a:solidFill>
+                          <a:effectLst/>
+                          <a:latin typeface="Franklin Gothic Book"/>
+                          <a:ea typeface="Franklin Gothic Book"/>
+                          <a:cs typeface="Franklin Gothic Book"/>
+                        </a:rPr>
+                        <a:t>Produktbeschreibung</a:t>
+                      </a:r>
+                      <a:r>
                         <a:rPr lang="de-DE" sz="3300" b="0" i="0" strike="noStrike" cap="none" baseline="0">
                           <a:solidFill>
                             <a:srgbClr val="FFFFFF"/>
@@ -12065,7 +12122,7 @@
                           <a:ea typeface="Franklin Gothic Book"/>
                           <a:cs typeface="Franklin Gothic Book"/>
                         </a:rPr>
-                        <a:t>Produktbeschreibung</a:t>
+                        <a:t>:</a:t>
                       </a:r>
                     </a:p>
                   </a:txBody>
@@ -12474,7 +12531,7 @@
         </p:nvGraphicFramePr>
         <p:xfrm>
           <a:off x="1096963" y="2287915"/>
-          <a:ext cx="10058401" cy="3910914"/>
+          <a:ext cx="10058401" cy="4124274"/>
         </p:xfrm>
         <a:graphic>
           <a:graphicData uri="http://schemas.openxmlformats.org/drawingml/2006/table">
@@ -12539,6 +12596,18 @@
                         </a:spcAft>
                       </a:pPr>
                       <a:r>
+                        <a:rPr lang="de-DE" sz="1400" b="1" i="0" strike="noStrike" cap="none" baseline="0">
+                          <a:solidFill>
+                            <a:srgbClr val="FFFFFF"/>
+                          </a:solidFill>
+                          <a:effectLst/>
+                          <a:latin typeface="Franklin Gothic Book"/>
+                          <a:ea typeface="Franklin Gothic Book"/>
+                          <a:cs typeface="Franklin Gothic Book"/>
+                        </a:rPr>
+                        <a:t>Produktbeschreibung</a:t>
+                      </a:r>
+                      <a:r>
                         <a:rPr lang="de-DE" sz="1400" b="0" i="0" strike="noStrike" cap="none" baseline="0">
                           <a:solidFill>
                             <a:srgbClr val="FFFFFF"/>
@@ -12548,7 +12617,7 @@
                           <a:ea typeface="Franklin Gothic Book"/>
                           <a:cs typeface="Franklin Gothic Book"/>
                         </a:rPr>
-                        <a:t>Produktbeschreibung</a:t>
+                        <a:t>:</a:t>
                       </a:r>
                       <a:endParaRPr lang="en-US" sz="2300">
                         <a:effectLst/>
@@ -12738,7 +12807,7 @@
                           <a:ea typeface="Franklin Gothic Book"/>
                           <a:cs typeface="Franklin Gothic Book"/>
                         </a:rPr>
-                        <a:t>Authentic Blend: Unsere Chai ist eine harmonische Mischung aus Premium-Schwarzen Teeblättern und einer charakteristischen Auswahl an gemahlenen Gewürzen, darunter Knoblauch, Karamom, Gerinnsel, Ingwer und schwarzer Pfeffer.</a:t>
+                        <a:t>Authentischer Blend: Unser Chai ist eine harmonische Mischung aus schwarzen Teeblättern in Premiumqualität und einer charakteristischen Auswahl an gemahlenen Gewürzen, darunter Knoblauch, Karamom, Gerinnsel, Ingwer und schwarzer Pfeffer.</a:t>
                       </a:r>
                       <a:r>
                         <a:rPr lang="de-DE" sz="1400" b="0" i="0" strike="noStrike" cap="none" baseline="0">
@@ -12791,7 +12860,7 @@
                           <a:ea typeface="Franklin Gothic Book"/>
                           <a:cs typeface="Franklin Gothic Book"/>
                         </a:rPr>
-                        <a:t>Gesundheitsfördernde Inhaltsstoffe: Jeder Bestandteil von Mystisch Gewürz-Chai-Tee wird für seine natürlichen Gesundheitlichen Vorteile ausgewählt.</a:t>
+                        <a:t>Gesundheitsfördernde Inhaltsstoffe: Die Zutaten von Mystic Spice Chai Tea werden nach ihren Vorteilen für die Gesundheit ausgewählt.</a:t>
                       </a:r>
                       <a:r>
                         <a:rPr lang="de-DE" sz="1400" b="0" i="0" strike="noStrike" cap="none" baseline="0">
@@ -13229,7 +13298,7 @@
         </p:nvGraphicFramePr>
         <p:xfrm>
           <a:off x="5282335" y="1994843"/>
-          <a:ext cx="6275668" cy="4012742"/>
+          <a:ext cx="6275668" cy="4180382"/>
         </p:xfrm>
         <a:graphic>
           <a:graphicData uri="http://schemas.openxmlformats.org/drawingml/2006/table">
@@ -13294,6 +13363,18 @@
                         </a:spcAft>
                       </a:pPr>
                       <a:r>
+                        <a:rPr lang="de-DE" sz="1100" b="1" i="0" strike="noStrike" cap="none" baseline="0">
+                          <a:solidFill>
+                            <a:srgbClr val="FFFFFF"/>
+                          </a:solidFill>
+                          <a:effectLst/>
+                          <a:latin typeface="Franklin Gothic Book"/>
+                          <a:ea typeface="Franklin Gothic Book"/>
+                          <a:cs typeface="Franklin Gothic Book"/>
+                        </a:rPr>
+                        <a:t>Produktbeschreibung</a:t>
+                      </a:r>
+                      <a:r>
                         <a:rPr lang="de-DE" sz="1100" b="0" i="0" strike="noStrike" cap="none" baseline="0">
                           <a:solidFill>
                             <a:srgbClr val="FFFFFF"/>
@@ -13303,7 +13384,7 @@
                           <a:ea typeface="Franklin Gothic Book"/>
                           <a:cs typeface="Franklin Gothic Book"/>
                         </a:rPr>
-                        <a:t>Produktbeschreibung</a:t>
+                        <a:t>:</a:t>
                       </a:r>
                       <a:endParaRPr lang="en-US" sz="1700">
                         <a:effectLst/>
@@ -13339,7 +13420,7 @@
                           <a:ea typeface="Franklin Gothic Book"/>
                           <a:cs typeface="Franklin Gothic Book"/>
                         </a:rPr>
-                        <a:t>Reichhaltiges Aroma und Geschmack: Das warme, würzige Aroma und tiefe, belebende Geschmack unserer Chai machen es zum perfekten Getränk, um Ihren Tag zu beginnen oder sich am Abend zu entspannen.</a:t>
+                        <a:t>Reichhaltig an Aroma und Geschmack: Das warme, würzige Aroma und der belebende Geschmack unseres Chai machen ihn zum perfekten Getränk zum Tagesanfang oder an einem erholsamen Abend.</a:t>
                       </a:r>
                       <a:r>
                         <a:rPr lang="de-DE" sz="1100" b="0" i="0" strike="noStrike" cap="none" baseline="0">
@@ -13392,7 +13473,7 @@
                           <a:ea typeface="Franklin Gothic Book"/>
                           <a:cs typeface="Franklin Gothic Book"/>
                         </a:rPr>
-                        <a:t>Vielseitige Brauoptionen: Ob Sie Ihre Chai heiß dampfen, als erfrischender Eistee oder als cremefarbene Latte lieben, ist unsere Mischung vielseitig genug für jede Vorliebe.</a:t>
+                        <a:t>Vielseitige Zubereitungsmöglichkeiten: Genießen Sie Ihren Chai dampfend heiß, als erfrischenden Eistee oder als cremefarbenen Chai Latte, unsere vielseitige Mischung erfüllt Ihnen jeden Wunsch.</a:t>
                       </a:r>
                       <a:r>
                         <a:rPr lang="de-DE" sz="1100" b="0" i="0" strike="noStrike" cap="none" baseline="0">
@@ -13452,7 +13533,7 @@
                           <a:ea typeface="Franklin Gothic Book"/>
                           <a:cs typeface="Franklin Gothic Book"/>
                         </a:rPr>
-                        <a:t>Nachhaltig gewonnen: Wir engagieren uns für Nachhaltigkeit, wir beziehen unsere Zutaten aus kleinflächigen Farmen, die ökologische Landwirtschaft betreiben, und sorgen nicht nur für die feinste Qualität, sondern auch für das Wohlergehen unseres Planeten.</a:t>
+                        <a:t>Nachhaltig gewonnen: Wir engagieren uns für Nachhaltigkeit, wir beziehen unsere Inhaltsstoffe von kleinen Bauernhöfen, die ökologische Landwirtschaft betreiben.  Sie sorgen nicht nur für die feinste Qualität, sondern auch für das Wohlergehen unseres Planeten.</a:t>
                       </a:r>
                       <a:endParaRPr lang="en-US" sz="1700">
                         <a:effectLst/>
@@ -13481,7 +13562,7 @@
                           <a:ea typeface="Franklin Gothic Book"/>
                           <a:cs typeface="Franklin Gothic Book"/>
                         </a:rPr>
-                        <a:t>Elegante Verpackung: Mystisch Gewürz-Chai-Tee kommt in wunderschön gestalteten, umweltfreundlichen Verpackungen, sodass es ein ideales Geschenk für Teeliebhaber oder ein luxuriöser Genuss für sich selbst ist.</a:t>
+                        <a:t>Elegante Verpackung: Mit wunderschön gestalteter umweltfreundlicher Verpackung ist der Mystic Spice Chai Tea  das perfekte Geschenk für Teeliebhaber oder ein luxuriöser Genuss  für Sie selbst.</a:t>
                       </a:r>
                       <a:endParaRPr lang="en-US" sz="1700">
                         <a:effectLst/>
@@ -13517,7 +13598,7 @@
                           <a:ea typeface="Franklin Gothic Book"/>
                           <a:cs typeface="Franklin Gothic Book"/>
                         </a:rPr>
-                        <a:t>Kundenzufriedenheitsgarantie: Wir stehen hinter unserem Produkt und bieten eine Zufriedenheitsgarantie.</a:t>
+                        <a:t>Mit Kundenzufriedenheitsgarantie: Wir stehen hinter unserem Produkt und bieten Ihnen eine Zufriedenheitsgarantie.</a:t>
                       </a:r>
                       <a:r>
                         <a:rPr lang="de-DE" sz="1100" b="0" i="0" strike="noStrike" cap="none" baseline="0">
@@ -13570,7 +13651,7 @@
                           <a:ea typeface="Franklin Gothic Book"/>
                           <a:cs typeface="Franklin Gothic Book"/>
                         </a:rPr>
-                        <a:t>Ideal für: Tee-Enthusiasten, gesundheitsbewusste Einzelpersonen, Liebhaber warmer, würziger Getränke und jeder, der die reichen Aromen der traditionellen indischen Chai erkunden möchte.</a:t>
+                        <a:t>Perfekt geeignet für: Tee-Enthusiasten, gesundheitsbewusste Liebhaber warmer und würziger Getränke und jeden, der die reichen Aromen der traditionellen indischen Chai erkunden möchte.</a:t>
                       </a:r>
                       <a:endParaRPr lang="en-US" sz="1700">
                         <a:effectLst/>
@@ -14187,7 +14268,7 @@
         </p:nvGraphicFramePr>
         <p:xfrm>
           <a:off x="643192" y="1541387"/>
-          <a:ext cx="5115348" cy="3728172"/>
+          <a:ext cx="5115348" cy="4032972"/>
         </p:xfrm>
         <a:graphic>
           <a:graphicData uri="http://schemas.openxmlformats.org/drawingml/2006/table">
@@ -14263,7 +14344,7 @@
                     <a:lstStyle/>
                     <a:p>
                       <a:r>
-                        <a:rPr lang="de-DE" sz="2000" b="0" i="0" strike="noStrike" cap="all" baseline="0">
+                        <a:rPr lang="de-DE" sz="2000" b="1" i="0" strike="noStrike" cap="all" baseline="0">
                           <a:solidFill>
                             <a:srgbClr val="000000"/>
                           </a:solidFill>
@@ -14272,7 +14353,7 @@
                           <a:ea typeface="Franklin Gothic Book"/>
                           <a:cs typeface="Franklin Gothic Book"/>
                         </a:rPr>
-                        <a:t>Größe des Chai-Tee-Marktes (Mrd. USD)</a:t>
+                        <a:t>Größe des Chai-Tee-Marketes (Mrd. USD)</a:t>
                       </a:r>
                     </a:p>
                   </a:txBody>
@@ -14298,7 +14379,7 @@
                     <a:lstStyle/>
                     <a:p>
                       <a:r>
-                        <a:rPr lang="de-DE" sz="2000" b="0" i="0" strike="noStrike" cap="all" baseline="0">
+                        <a:rPr lang="de-DE" sz="2000" b="1" i="0" strike="noStrike" cap="all" baseline="0">
                           <a:solidFill>
                             <a:srgbClr val="000000"/>
                           </a:solidFill>
@@ -14307,7 +14388,7 @@
                           <a:ea typeface="Franklin Gothic Book"/>
                           <a:cs typeface="Franklin Gothic Book"/>
                         </a:rPr>
-                        <a:t>CAGR (2020–2027)</a:t>
+                        <a:t>CAGR (2020-2027)</a:t>
                       </a:r>
                     </a:p>
                   </a:txBody>
@@ -14915,7 +14996,7 @@
                 <a:ea typeface="Franklin Gothic Book"/>
                 <a:cs typeface="Franklin Gothic Book"/>
               </a:rPr>
-              <a:t>Großhändler: Verkaufen von Chai-Teeprodukten in Massen an Einzelhändler</a:t>
+              <a:t>Großhändler: Verkauf von Chai-Teeprodukten in Massen an Einzelhändler</a:t>
             </a:r>
           </a:p>
           <a:p>
@@ -14929,7 +15010,7 @@
                 <a:ea typeface="Franklin Gothic Book"/>
                 <a:cs typeface="Franklin Gothic Book"/>
               </a:rPr>
-              <a:t>Distributoren: Transport Chai Teeprodukte von Herstellern zu Einzelhändlern</a:t>
+              <a:t>Distributoren: Lieferung der Chai-Tee-Produkte von Herstellern zu Einzelhändlern</a:t>
             </a:r>
           </a:p>
         </p:txBody>
@@ -15132,7 +15213,7 @@
                 <a:ea typeface="Bookman Old Style"/>
                 <a:cs typeface="Bookman Old Style"/>
               </a:rPr>
-              <a:t>Vertriebskanäle: Großhändler</a:t>
+              <a:t>Vertriebskanäle: Großhandelsunternehmen</a:t>
             </a:r>
           </a:p>
         </p:txBody>

</xml_diff>

<commit_message>
Copy Files From Source Repo (2024-07-19 18:34)
</commit_message>
<xml_diff>
--- a/ResourceFiles/Mystic Spice Premium Chai Market Analysis Presentation.pptx
+++ b/ResourceFiles/Mystic Spice Premium Chai Market Analysis Presentation.pptx
@@ -524,7 +524,7 @@
                 <a:ea typeface="Aptos"/>
                 <a:cs typeface="Aptos"/>
               </a:rPr>
-              <a:t>Diese Präsentation wurde automatisch von PowerPoint Copilot basierend auf inhalten generiert, die in diesem Dokument gefunden wurden:</a:t>
+              <a:t>Diese Präsentation wurde automatisch von PowerPoint Copilot generiert und basiert auf Inhalten, die in diesem Dokument gefunden wurden:</a:t>
             </a:r>
             <a:r>
               <a:rPr sz="1200"/>
@@ -568,7 +568,7 @@
                 <a:ea typeface="Aptos"/>
                 <a:cs typeface="Aptos"/>
               </a:rPr>
-              <a:t>VON KI generierten Inhalten sind möglicherweise falsch.</a:t>
+              <a:t>VON KI generierte Inhalte sind möglicherweise nicht korrekt.</a:t>
             </a:r>
           </a:p>
         </p:txBody>
@@ -736,7 +736,7 @@
                 <a:ea typeface="Aptos"/>
                 <a:cs typeface="Aptos"/>
               </a:rPr>
-              <a:t>Original Content:</a:t>
+              <a:t>Originalinhalt:</a:t>
             </a:r>
             <a:r>
               <a:rPr sz="1200"/>
@@ -753,7 +753,7 @@
                 <a:ea typeface="Aptos"/>
                 <a:cs typeface="Aptos"/>
               </a:rPr>
-              <a:t>Distributoren sind die Unternehmen, die Chai-Teeprodukte im Namen der Hersteller oder Großhändler vertreten und vertreiben.</a:t>
+              <a:t>Vertriebspartner sind die Unternehmen, die Chai-Tee-Produkte im Namen der Hersteller oder Großhändler vertreten und vertreiben.</a:t>
             </a:r>
             <a:r>
               <a:rPr lang="de-DE" sz="1200" b="0" i="0" strike="noStrike" cap="none" baseline="0">
@@ -825,7 +825,12 @@
                 <a:ea typeface="Aptos"/>
                 <a:cs typeface="Aptos"/>
               </a:rPr>
-              <a:t>Zu den wichtigsten Vertriebspartnern für Chai-Tee-Produkte in Lateinamerika gehören Unilever, Nestle, Coca-Cola und PepsiCo.</a:t>
+              <a:t>Zu den wichtigsten Vertriebspartnern von Chai-Tee-Produkten in Lateinamerika gehören Unilever, Nestle, Coca-Cola und PepsiCo.</a:t>
+            </a:r>
+            <a:r>
+              <a:rPr sz="1200"/>
+              <a:t>
+</a:t>
             </a:r>
           </a:p>
         </p:txBody>
@@ -966,7 +971,7 @@
                 <a:ea typeface="Aptos"/>
                 <a:cs typeface="Aptos"/>
               </a:rPr>
-              <a:t>Der Plan wird über 12 Monate mit einem Budget von 100.000 US-Dollar implementiert und mithilfe von Schlüsselleistungsindikatoren ausgewertet.</a:t>
+              <a:t>Der Plan wird über 12 Monate mit einem Budget von 100.000 US-Dollar implementiert und mithilfe von wichtigen Leistungsindikatoren ausgewertet.</a:t>
             </a:r>
             <a:r>
               <a:rPr sz="1200"/>
@@ -993,7 +998,7 @@
                 <a:ea typeface="Aptos"/>
                 <a:cs typeface="Aptos"/>
               </a:rPr>
-              <a:t>Ursprünglicher Inhalt:</a:t>
+              <a:t>Originalinhalt:</a:t>
             </a:r>
             <a:r>
               <a:rPr sz="1200"/>
@@ -1010,7 +1015,7 @@
                 <a:ea typeface="Aptos"/>
                 <a:cs typeface="Aptos"/>
               </a:rPr>
-              <a:t>Promotionsplan und Strategie</a:t>
+              <a:t>Werbeplan und -strategie</a:t>
             </a:r>
             <a:r>
               <a:rPr sz="1200"/>
@@ -1027,7 +1032,7 @@
                 <a:ea typeface="Aptos"/>
                 <a:cs typeface="Aptos"/>
               </a:rPr>
-              <a:t>Der Promotionsplan und die Strategie für Chai-Tee in Lateinamerika zielt darauf ab, die folgenden Ziele zu erreichen:</a:t>
+              <a:t>Der Werbeplan und die Werbestrategie für Chai-Tee in Lateinamerika zielen darauf ab, die folgenden Ziele zu erreichen:</a:t>
             </a:r>
             <a:r>
               <a:rPr sz="1200"/>
@@ -1044,7 +1049,7 @@
                 <a:ea typeface="Aptos"/>
                 <a:cs typeface="Aptos"/>
               </a:rPr>
-              <a:t>·         Bewusstsein und Interesse an Chai-Tee unter der Zielgruppe</a:t>
+              <a:t>· Steigerung des Bewusstseins für und des Interesses an Chai-Tee in der Zielgruppe</a:t>
             </a:r>
             <a:r>
               <a:rPr sz="1200"/>
@@ -1061,7 +1066,7 @@
                 <a:ea typeface="Aptos"/>
                 <a:cs typeface="Aptos"/>
               </a:rPr>
-              <a:t> erhöhen·         Position Chai Tee als Premium-, Natürliches und gesundes Produkt, das ein einzigartiges und befriedigendes Erlebnis</a:t>
+              <a:t>· Positionierung von Chai-Tee als natürliches und gesundes Premium-Produkt, das einen einzigartigen Genuss bietet</a:t>
             </a:r>
             <a:r>
               <a:rPr sz="1200"/>
@@ -1078,7 +1083,7 @@
                 <a:ea typeface="Aptos"/>
                 <a:cs typeface="Aptos"/>
               </a:rPr>
-              <a:t> bietet·         Ermutigen Sie die Testversion und den Kauf von Chai-Tee über verschiedene Kanäle und Anreize</a:t>
+              <a:t>· Ermutigung zum Ausprobieren und Kaufen von Chai-Tee über verschiedene Vertriebskanäle</a:t>
             </a:r>
             <a:r>
               <a:rPr sz="1200"/>
@@ -1095,7 +1100,7 @@
                 <a:ea typeface="Aptos"/>
                 <a:cs typeface="Aptos"/>
               </a:rPr>
-              <a:t>·         Bauen Sie Loyalität und Aufbewahrung zwischen Chai-Tee-Verbrauchern durch Engagement und Feedback</a:t>
+              <a:t>· Aufbau von Treue und Bindung der Chai-Tee-Verbrauchenden durch Engagement und Feedback</a:t>
             </a:r>
             <a:r>
               <a:rPr sz="1200"/>
@@ -1112,7 +1117,7 @@
                 <a:ea typeface="Aptos"/>
                 <a:cs typeface="Aptos"/>
               </a:rPr>
-              <a:t>. Der Promotionsplan und die Strategie für Chai-Tee in Lateinamerika werden eine Kombination aus Taktiken wie:</a:t>
+              <a:t>Werbeplan und  und -strategie für Chai-Tee in Lateinamerika werden sich einer Kombination von Taktiken bedienen, wie etwa:</a:t>
             </a:r>
             <a:r>
               <a:rPr sz="1200"/>
@@ -1129,7 +1134,7 @@
                 <a:ea typeface="Aptos"/>
                 <a:cs typeface="Aptos"/>
               </a:rPr>
-              <a:t>·         Erstellen eines catchy und unvergesslichen Markennamens und Logos für Chai-Tee</a:t>
+              <a:t>· Erstellung eines attraktiven und unvergesslichen Markennamens und Logos für Chai-Tee</a:t>
             </a:r>
             <a:r>
               <a:rPr sz="1200"/>
@@ -1146,7 +1151,7 @@
                 <a:ea typeface="Aptos"/>
                 <a:cs typeface="Aptos"/>
               </a:rPr>
-              <a:t>·         Entwicklung einer Website und Social Media Präsenz für Chai-Tee, die seine Vorteile, Features und Geschichten</a:t>
+              <a:t>· Entwicklung einer Website und Präsenz in den sozialen Medien für Chai-Tee, um seine Vorteile, Eigenschaften und Geschichten zu präsentieren</a:t>
             </a:r>
             <a:r>
               <a:rPr sz="1200"/>
@@ -1163,7 +1168,7 @@
                 <a:ea typeface="Aptos"/>
                 <a:cs typeface="Aptos"/>
               </a:rPr>
-              <a:t> zeigt·         Einführung einer digitalen Marketingkampagne, die SEO, SEM, E-Mail-Marketing und Influencer-Marketing verwendet, um potenzielle Kunden</a:t>
+              <a:t>· Einführung einer digitalen Marketingkampagne, die SEO, SEM, E-Mail-Marketing und Influencer-Marketing verwendet, um potenzielle Kundinnen und Kunden zu erreichen und zu gewinnen</a:t>
             </a:r>
             <a:r>
               <a:rPr sz="1200"/>
@@ -1180,7 +1185,7 @@
                 <a:ea typeface="Aptos"/>
                 <a:cs typeface="Aptos"/>
               </a:rPr>
-              <a:t> zu erreichen und zu gewinnen·         Verteilen kostenloser Proben und Coupons von Chai-Tee an strategischen Standorten, wie Supermärkten, Cafés und Gesundheitsgeschäften</a:t>
+              <a:t>· Verteilung kostenloser Proben und Coupons für Chai-Tee an strategischen Standorten wie Supermärkten, Cafés und Gesundheitsgeschäften</a:t>
             </a:r>
             <a:r>
               <a:rPr sz="1200"/>
@@ -1197,7 +1202,7 @@
                 <a:ea typeface="Aptos"/>
                 <a:cs typeface="Aptos"/>
               </a:rPr>
-              <a:t>·         Organisieren von Veranstaltungen und Wettbewerben, die Personen einladen, Chai-Tee mit ihren Freunden und der Familie</a:t>
+              <a:t>· Organisation von Veranstaltungen und Wettbewerben, bei denen Personen eingeladen werden, Chai-Tee mit ihren Freunden und der Familie zu probieren</a:t>
             </a:r>
             <a:r>
               <a:rPr sz="1200"/>
@@ -1214,7 +1219,7 @@
                 <a:ea typeface="Aptos"/>
                 <a:cs typeface="Aptos"/>
               </a:rPr>
-              <a:t> zu teilen·         Die Zusammenarbeit mit lokalen Unternehmen und Organisationen, die die gleichen Werte und Visionen wie Chai Tea</a:t>
+              <a:t>· Zusammenarbeit mit lokalen Unternehmen und Organisationen, deren Werte und Visionen mit Chai-Tee im Einklang stehen</a:t>
             </a:r>
             <a:r>
               <a:rPr sz="1200"/>
@@ -1231,7 +1236,7 @@
                 <a:ea typeface="Aptos"/>
                 <a:cs typeface="Aptos"/>
               </a:rPr>
-              <a:t>teilen, der Promotionsplan und die Strategie für Chai-Tee in Lateinamerika werden über einen Zeitraum von 12 Monaten mit einem Budget von 100.000 US-Dollar implementiert.</a:t>
+              <a:t>Werbeplan und -strategie für Chai-Tee in Lateinamerika werden über einen Zeitraum von 12 Monaten mit einem Budget von 100.000 US-Dollar umgesetzt.</a:t>
             </a:r>
             <a:r>
               <a:rPr lang="de-DE" sz="1200" b="0" i="0" strike="noStrike" cap="none" baseline="0">
@@ -1255,7 +1260,12 @@
                 <a:ea typeface="Aptos"/>
                 <a:cs typeface="Aptos"/>
               </a:rPr>
-              <a:t>Der Plan wird anhand von Leistungsindikatoren wie Website-Datenverkehr, Social-Media-Engagement, E-Mail-Öffnungsraten, Konversionsraten, Umsatzvolumen, Kundenzufriedenheit und Kundenbindungsraten überwacht und bewertet.</a:t>
+              <a:t>Der Plan wird anhand von Leistungsindikatoren wie Website-Datenverkehr, Engagement in sozialen Medien, E-Mail-Öffnungsraten, Konversionsraten, Umsatzvolumen, Kundenzufriedenheit und Kundenbindungsraten überwacht und bewertet.</a:t>
+            </a:r>
+            <a:r>
+              <a:rPr sz="1200"/>
+              <a:t>
+</a:t>
             </a:r>
           </a:p>
         </p:txBody>
@@ -1348,7 +1358,7 @@
                 <a:ea typeface="Aptos"/>
                 <a:cs typeface="Aptos"/>
               </a:rPr>
-              <a:t>Der Promotionsplan und die Strategie für Chai-Tee in Lateinamerika werden voraussichtlich zu einem 20%igen Anstieg des Bewusstseins und des Interesses, einer Steigerung des Marktanteils von 10 %, einer Steigerung des Umsatzes und des Umsatzes von 15 % und einer Steigerung der Kundenzufriedenheit und -aufbewahrungsraten führen.</a:t>
+              <a:t>Der Absatzförderungsplan und die Strategie für Chai-Tee in Lateinamerika werden voraussichtlich zu einem 20%igen Anstieg des Bewusstseins und des Interesses um 20 %, zum Wachstum des Marktanteils um 10 %, zur Erhöhung des Volumens und einer Umsatzsteigerung um 15 % und einer höheren Kundenzufriedenheit und Bindungsrate führen.</a:t>
             </a:r>
             <a:r>
               <a:rPr sz="1200"/>
@@ -1409,7 +1419,7 @@
                 <a:ea typeface="Aptos"/>
                 <a:cs typeface="Aptos"/>
               </a:rPr>
-              <a:t>Die erwarteten Ergebnisse des Promotionsplans und der Strategie für Chai-Tee in Lateinamerika sind:</a:t>
+              <a:t>Die erwarteten Ergebnisse des Werbeplans und der Werbestrategie für Chai-Tee in Lateinamerika:</a:t>
             </a:r>
             <a:r>
               <a:rPr sz="1200"/>
@@ -1426,7 +1436,7 @@
                 <a:ea typeface="Aptos"/>
                 <a:cs typeface="Aptos"/>
               </a:rPr>
-              <a:t>·         Ein Anstieg des Bewusstseins und des Interesses an Chai-Tee unter der Zielgruppe</a:t>
+              <a:t>· Ein Anstieg des Bewusstseins für und des Interesses an Chai-Tee in der Zielgruppe um 20 %</a:t>
             </a:r>
             <a:r>
               <a:rPr sz="1200"/>
@@ -1443,7 +1453,7 @@
                 <a:ea typeface="Aptos"/>
                 <a:cs typeface="Aptos"/>
               </a:rPr>
-              <a:t> um 20 %         Ein Anstieg des Marktanteils von Chai-Tee in der Region</a:t>
+              <a:t>· Ein Anstieg des Marktanteils von Chai-Tee in der Region um 10 %</a:t>
             </a:r>
             <a:r>
               <a:rPr sz="1200"/>
@@ -1460,7 +1470,7 @@
                 <a:ea typeface="Aptos"/>
                 <a:cs typeface="Aptos"/>
               </a:rPr>
-              <a:t> um 10 % ·         Eine Steigerung des Umsatzes und des Umsatzes von Chai-Tee in der Region</a:t>
+              <a:t>· Eine Steigerung des Umsatzvolumens und des Umsatzerlöses von Chai-Tee in der Region um 15 %</a:t>
             </a:r>
             <a:r>
               <a:rPr sz="1200"/>
@@ -1477,7 +1487,7 @@
                 <a:ea typeface="Aptos"/>
                 <a:cs typeface="Aptos"/>
               </a:rPr>
-              <a:t> um 15 % ·         25% Steigerung der Kundenzufriedenheit und Aufbewahrungsraten von Chai-Tee in der Region</a:t>
+              <a:t>· Höhere Kundenzufriedenheits- und Kundenbindungsraten für Chai-Tee in der Region</a:t>
             </a:r>
             <a:r>
               <a:rPr sz="1200"/>
@@ -1575,7 +1585,7 @@
                 <a:ea typeface="Aptos"/>
                 <a:cs typeface="Aptos"/>
               </a:rPr>
-              <a:t>Der Promotionsplan und die Strategie für Chai-Tee in Lateinamerika stehen vor mehreren Herausforderungen, darunter hoher Preis, Mangelndes Bewusstsein, Wettbewerb von anderen Teeprodukten, regulatorischen und kulturellen Hindernissen sowie umweltpolitische und soziale Fragen, die sich auf die Versorgung und Qualität von Chai-Teezutaten auswirken können.</a:t>
+              <a:t>Der Absatzförderungsplan und die Strategie für Chai-Tee in Lateinamerika stehen vor mehreren Herausforderungen, darunter hoher Preis, mangelndes Bewusstsein, Wettbewerb anderer Teeprodukte, regulatorische und kulturelle Hindernissen sowie umweltpolitische und soziale Fragen, die sich auf die Versorgung und Qualität von Chai-Teezutaten auswirken.</a:t>
             </a:r>
             <a:r>
               <a:rPr sz="1200"/>
@@ -1619,7 +1629,7 @@
                 <a:ea typeface="Aptos"/>
                 <a:cs typeface="Aptos"/>
               </a:rPr>
-              <a:t>Die potenziellen Herausforderungen des Promotionsplans und der Strategie für Chai-Tee in Lateinamerika sind:</a:t>
+              <a:t>Die potenziellen Herausforderungen des Promotionsplans und der Strategie für Chai-Tee in Lateinamerika:</a:t>
             </a:r>
             <a:r>
               <a:rPr sz="1200"/>
@@ -1636,7 +1646,7 @@
                 <a:ea typeface="Aptos"/>
                 <a:cs typeface="Aptos"/>
               </a:rPr>
-              <a:t>·         Der hohe Preis und niedrige Erschwinglichkeit von Chai-Teeprodukten im Vergleich zu anderen Getränken</a:t>
+              <a:t> Der hohe und kaum erschwingliche Preis von Chai-Tee-Produkten im Vergleich zu anderen Getränken</a:t>
             </a:r>
             <a:r>
               <a:rPr sz="1200"/>
@@ -1653,7 +1663,7 @@
                 <a:ea typeface="Aptos"/>
                 <a:cs typeface="Aptos"/>
               </a:rPr>
-              <a:t>·         Der Mangel an Bewusstsein und Vertrautheit mit Chai-Tee unter einigen Segmenten der Bevölkerung</a:t>
+              <a:t>·Ein Mangel an Bewusstsein und Vertrautheit mit Chai-Tee in einigen Zielgruppen der Bevölkerung</a:t>
             </a:r>
             <a:r>
               <a:rPr sz="1200"/>
@@ -1670,7 +1680,7 @@
                 <a:ea typeface="Aptos"/>
                 <a:cs typeface="Aptos"/>
               </a:rPr>
-              <a:t>·         Der Wettbewerb gegen andere Teeprodukte wie Kräuter-, Grün- und Schwarztees</a:t>
+              <a:t>·Der Wettbewerb durch andere Teeprodukte wie Kräuter-, Grün- und Schwarztees</a:t>
             </a:r>
             <a:r>
               <a:rPr sz="1200"/>
@@ -1687,7 +1697,7 @@
                 <a:ea typeface="Aptos"/>
                 <a:cs typeface="Aptos"/>
               </a:rPr>
-              <a:t>·         Die regulatorischen und kulturellen Hindernisse, die den Eintritt und die Expansion von Chai-Teeprodukten in einigen Ländern</a:t>
+              <a:t> Regulatorische und kulturelle Hindernisse, die den Eintritt und die Expansion von Chai-Tee-Produkten in einigen Ländern einschränken</a:t>
             </a:r>
             <a:r>
               <a:rPr sz="1200"/>
@@ -1704,7 +1714,7 @@
                 <a:ea typeface="Aptos"/>
                 <a:cs typeface="Aptos"/>
               </a:rPr>
-              <a:t> einschränken können·         Die Umwelt- und Sozialfragen, die sich auf die Versorgung und Qualität von Chai-Teezutaten auswirken können</a:t>
+              <a:t>Umweltbelange und soziale Fragen, die sich auf die Versorgung und Qualität von Chai-Teezutaten auswirken</a:t>
             </a:r>
             <a:r>
               <a:rPr sz="1200"/>
@@ -1850,7 +1860,7 @@
                 <a:ea typeface="Aptos"/>
                 <a:cs typeface="Aptos"/>
               </a:rPr>
-              <a:t>Eine Mischung aus Online- und Offline-Taktiken sollte verwendet werden, um die Zielgruppe zu erreichen und Herausforderungen zu überwinden.</a:t>
+              <a:t>Es sollte eine Mischung aus Online- und Offline-Taktiken verwendet werden, um die Zielgruppe zu erreichen und die Herausforderungen zu meistern.</a:t>
             </a:r>
             <a:r>
               <a:rPr sz="1200"/>
@@ -1894,7 +1904,7 @@
                 <a:ea typeface="Aptos"/>
                 <a:cs typeface="Aptos"/>
               </a:rPr>
-              <a:t>Empfehlungen und Schlussfolgerungen basierend auf der Marktanalyse, der Wettbewerbsanalyse, den Vertriebskanälen und dem Promotionsplan und der Strategie können die folgenden Empfehlungen und Schlussfolgerungen</a:t>
+              <a:t>Empfehlungen und Schlussfolgerungen</a:t>
             </a:r>
             <a:r>
               <a:rPr sz="1200"/>
@@ -1911,7 +1921,7 @@
                 <a:ea typeface="Aptos"/>
                 <a:cs typeface="Aptos"/>
               </a:rPr>
-              <a:t>für die Zukunft von Chai-Tee in Lateinamerika gezogen werden:</a:t>
+              <a:t>Basierend auf der Marktanalyse, der Wettbewerbsanalyse, den Vertriebskanälen sowie dem Werbeplan und der Werbestrategie können die folgenden Empfehlungen gegeben und Schlussfolgerungen in Bezug auf die Zukunft von Chai-Tee in Lateinamerika gezogen werden:</a:t>
             </a:r>
             <a:r>
               <a:rPr sz="1200"/>
@@ -1928,7 +1938,7 @@
                 <a:ea typeface="Aptos"/>
                 <a:cs typeface="Aptos"/>
               </a:rPr>
-              <a:t>·         Chai-Tee ist ein vielversprechendes Produkt, das im lateinamerikanischen Markt wachsen und erfolgreich sein kann, da es eine gesunde, natürliche und exotische Alternative zu anderen Getränken</a:t>
+              <a:t>· Chai-Tee ist ein vielversprechendes Produkt, das im lateinamerikanischen Markt wachsen und erfolgreich sein kann, weil er eine gesunde, natürliche und exotische Alternative zu anderen Getränken darstellt</a:t>
             </a:r>
             <a:r>
               <a:rPr sz="1200"/>
@@ -1945,7 +1955,7 @@
                 <a:ea typeface="Aptos"/>
                 <a:cs typeface="Aptos"/>
               </a:rPr>
-              <a:t> bietet·         Chai-Tee muss als Premium-, authentisches und vielseitiges Produkt positioniert und vermarktet werden, das verschiedene Segmente und Anlässe</a:t>
+              <a:t>· Chai-Tee muss als authentisches und vielseitiges Premiumprodukt positioniert und vermarktet werden, das für  verschiedene Zielgruppen und Anlässe attraktiv sein kann</a:t>
             </a:r>
             <a:r>
               <a:rPr sz="1200"/>
@@ -1962,7 +1972,7 @@
                 <a:ea typeface="Aptos"/>
                 <a:cs typeface="Aptos"/>
               </a:rPr>
-              <a:t> ansprechen kann·         Chai-Tee muss seine einzigartigen Merkmale und Vorteile nutzen, wie z. B. sein reichhaltiges Aroma, seinen Geschmack und seine gesundheitlichen Vorteile, um sich von anderen Teeprodukten</a:t>
+              <a:t>· Chai-Tee muss seine einzigartigen Merkmale und Vorteile nutzen, wie etwa sein reichhaltiges Aroma, seinen Geschmack und seine gesundheitlichen Vorteile, um sich von anderen Teeprodukten abzuheben</a:t>
             </a:r>
             <a:r>
               <a:rPr sz="1200"/>
@@ -1979,7 +1989,7 @@
                 <a:ea typeface="Aptos"/>
                 <a:cs typeface="Aptos"/>
               </a:rPr>
-              <a:t> zu unterscheiden·         Chai-Tee muss eine Mischung aus Online- und Offline-Taktiken verwenden, um die Zielgruppe zu erreichen und zu interagieren und eine loyale und zufriedene Kundenbasis</a:t>
+              <a:t>· Chai-Tee muss eine Kombination aus Online- und Offline-Taktiken verwenden, um die Zielgruppe zu erreichen, mit ihr zu interagieren und eine treue und zufriedene Kundenbasis zu schaffen</a:t>
             </a:r>
             <a:r>
               <a:rPr sz="1200"/>
@@ -1996,7 +2006,7 @@
                 <a:ea typeface="Aptos"/>
                 <a:cs typeface="Aptos"/>
               </a:rPr>
-              <a:t> zu schaffen·         Chai-Tee muss die Herausforderungen und Bedrohungen überwinden, die sein Wachstum und seine Expansion in der Region behindern können, wie z. B. Preis, Bewusstsein, Wettbewerb, Regulierung und Nachhaltigkeit</a:t>
+              <a:t>· Chai-Tee muss die Herausforderungen und Bedrohungen meistern, die sein Wachstum und seine Expansion in der Region behindern könnten, wie etwa Preis, Bewusstsein, Wettbewerb, Regulierung und Nachhaltigkeit</a:t>
             </a:r>
             <a:r>
               <a:rPr sz="1200"/>
@@ -2013,7 +2023,7 @@
                 <a:ea typeface="Aptos"/>
                 <a:cs typeface="Aptos"/>
               </a:rPr>
-              <a:t>Abschließend ist Chai Tee ein Produkt, das viel Potenzial und Chancen auf dem lateinamerikanischen Markt hat, aber auch einige Herausforderungen und Risiken konfrontiert.</a:t>
+              <a:t>Abschließend ist festzustellen, dass Chai-Tee ein Produkt ist, das hohes Potenzial und große Chancen auf dem lateinamerikanischen Markt hat, aber auch mit bestimmten Herausforderungen und Risiken konfrontiert ist.</a:t>
             </a:r>
             <a:r>
               <a:rPr lang="de-DE" sz="1200" b="0" i="0" strike="noStrike" cap="none" baseline="0">
@@ -2062,6 +2072,11 @@
                 <a:cs typeface="Aptos"/>
               </a:rPr>
               <a:t>Der Absatzförderungsplan und die Strategie müssen jedoch ständig überwacht, bewertet und entsprechend den sich ändernden Marktbedingungen und dem Kundenfeedback angepasst werden.</a:t>
+            </a:r>
+            <a:r>
+              <a:rPr sz="1200"/>
+              <a:t>
+</a:t>
             </a:r>
           </a:p>
         </p:txBody>
@@ -2312,7 +2327,7 @@
                 <a:ea typeface="Aptos"/>
                 <a:cs typeface="Aptos"/>
               </a:rPr>
-              <a:t> * David es Tea</a:t>
+              <a:t> * David's Tea</a:t>
             </a:r>
             <a:r>
               <a:rPr sz="1200"/>
@@ -2380,7 +2395,7 @@
                 <a:ea typeface="Aptos"/>
                 <a:cs typeface="Aptos"/>
               </a:rPr>
-              <a:t> * Händler</a:t>
+              <a:t> * Einzelhändler</a:t>
             </a:r>
             <a:r>
               <a:rPr sz="1200"/>
@@ -2397,7 +2412,7 @@
                 <a:ea typeface="Aptos"/>
                 <a:cs typeface="Aptos"/>
               </a:rPr>
-              <a:t> * Händler * Händler * Vertriebskanäle * Distributoren</a:t>
+              <a:t> * Großhändler</a:t>
             </a:r>
             <a:r>
               <a:rPr sz="1200"/>
@@ -2414,7 +2429,7 @@
                 <a:ea typeface="Aptos"/>
                 <a:cs typeface="Aptos"/>
               </a:rPr>
-              <a:t> * Vertriebspläne</a:t>
+              <a:t> * Vertriebskanäle </a:t>
             </a:r>
             <a:r>
               <a:rPr sz="1200"/>
@@ -2431,7 +2446,7 @@
                 <a:ea typeface="Aptos"/>
                 <a:cs typeface="Aptos"/>
               </a:rPr>
-              <a:t> und -strategie</a:t>
+              <a:t> * Absatzförderungsplan und Strategie</a:t>
             </a:r>
             <a:r>
               <a:rPr sz="1200"/>
@@ -2465,7 +2480,7 @@
                 <a:ea typeface="Aptos"/>
                 <a:cs typeface="Aptos"/>
               </a:rPr>
-              <a:t> * Erwartete Ergebnisse * Erwartete Ergebnisse</a:t>
+              <a:t> * Erwartete Ergebnisse</a:t>
             </a:r>
             <a:r>
               <a:rPr sz="1200"/>
@@ -2648,7 +2663,7 @@
                 <a:ea typeface="Aptos"/>
                 <a:cs typeface="Aptos"/>
               </a:rPr>
-              <a:t>Original Content:</a:t>
+              <a:t>Originalinhalt:</a:t>
             </a:r>
             <a:r>
               <a:rPr sz="1200"/>
@@ -2665,7 +2680,7 @@
                 <a:ea typeface="Aptos"/>
                 <a:cs typeface="Aptos"/>
               </a:rPr>
-              <a:t>Introductions</a:t>
+              <a:t>Einführung</a:t>
             </a:r>
             <a:r>
               <a:rPr sz="1200"/>
@@ -2682,7 +2697,7 @@
                 <a:ea typeface="Aptos"/>
                 <a:cs typeface="Aptos"/>
               </a:rPr>
-              <a:t>Mystic Spice Premium Chai Tea ist ein neues Produkt von Contoso Beverage, einem Unternehmen, das sich auf die Herstellung und Verteilung hochwertiger Getränke auf der ganzen Welt spezialisiert hat.</a:t>
+              <a:t>Mystic Spice Premium Chai Tea ist ein neues Produkt, das von Contoso Beverage auf den Markt gebracht wurde, einem Unternehmen, das sich auf die Herstellung und den Vertrieb von hochwertigen Getränken weltweit spezialisiert hat.</a:t>
             </a:r>
             <a:r>
               <a:rPr lang="de-DE" sz="1200" b="0" i="0" strike="noStrike" cap="none" baseline="0">
@@ -2779,42 +2794,6 @@
                 <a:cs typeface="Aptos"/>
               </a:rPr>
               <a:t>Er hat auch eine reiche kulturelle und historische Bedeutung, da er oft mit Gastfreundschaft, Freundschaft und Entspannung assoziiert wird.</a:t>
-            </a:r>
-            <a:r>
-              <a:rPr lang="de-DE" sz="1200" b="0" i="0" strike="noStrike" cap="none" baseline="0">
-                <a:solidFill>
-                  <a:srgbClr val="000000"/>
-                </a:solidFill>
-                <a:effectLst/>
-                <a:latin typeface="Aptos"/>
-                <a:ea typeface="Aptos"/>
-                <a:cs typeface="Aptos"/>
-              </a:rPr>
-              <a:t>Ziel dieses Berichts ist es, eine Marktanalyse für Mystic Spice Premium Chai Tea mit Fokus auf die Region Lateinamerika zu erstellen.</a:t>
-            </a:r>
-            <a:r>
-              <a:rPr lang="de-DE" sz="1200" b="0" i="0" strike="noStrike" cap="none" baseline="0">
-                <a:solidFill>
-                  <a:srgbClr val="000000"/>
-                </a:solidFill>
-                <a:effectLst/>
-                <a:latin typeface="Aptos"/>
-                <a:ea typeface="Aptos"/>
-                <a:cs typeface="Aptos"/>
-              </a:rPr>
-              <a:t> </a:t>
-            </a:r>
-            <a:r>
-              <a:rPr lang="de-DE" sz="1200" b="0" i="0" strike="noStrike" cap="none" baseline="0">
-                <a:solidFill>
-                  <a:srgbClr val="000000"/>
-                </a:solidFill>
-                <a:effectLst/>
-                <a:latin typeface="Aptos"/>
-                <a:ea typeface="Aptos"/>
-                <a:cs typeface="Aptos"/>
-              </a:rPr>
-              <a:t>Der Bericht wird die folgenden Aspekte abdecken:</a:t>
             </a:r>
             <a:r>
               <a:rPr sz="1200"/>
@@ -2831,7 +2810,31 @@
                 <a:ea typeface="Aptos"/>
                 <a:cs typeface="Aptos"/>
               </a:rPr>
-              <a:t>·         Die Produktbeschreibung, Features und Vorteile von Mystic Spice Premium Chai Tea</a:t>
+              <a:t>Ziel dieses Berichts ist es, eine Marktanalyse für Mystic Spice Premium Chai Tea mit Fokus auf die Region Lateinamerika zu erstellen.</a:t>
+            </a:r>
+            <a:r>
+              <a:rPr lang="de-DE" sz="1200" b="0" i="0" strike="noStrike" cap="none" baseline="0">
+                <a:solidFill>
+                  <a:srgbClr val="000000"/>
+                </a:solidFill>
+                <a:effectLst/>
+                <a:latin typeface="Aptos"/>
+                <a:ea typeface="Aptos"/>
+                <a:cs typeface="Aptos"/>
+              </a:rPr>
+              <a:t> </a:t>
+            </a:r>
+            <a:r>
+              <a:rPr lang="de-DE" sz="1200" b="0" i="0" strike="noStrike" cap="none" baseline="0">
+                <a:solidFill>
+                  <a:srgbClr val="000000"/>
+                </a:solidFill>
+                <a:effectLst/>
+                <a:latin typeface="Aptos"/>
+                <a:ea typeface="Aptos"/>
+                <a:cs typeface="Aptos"/>
+              </a:rPr>
+              <a:t>Der Bericht wird die folgenden Aspekte abdecken:</a:t>
             </a:r>
             <a:r>
               <a:rPr sz="1200"/>
@@ -2848,7 +2851,7 @@
                 <a:ea typeface="Aptos"/>
                 <a:cs typeface="Aptos"/>
               </a:rPr>
-              <a:t>·         Markttrend und Nachfrage nach Chai-Tee in Lateinamerika</a:t>
+              <a:t>·         Produktbeschreibung, Merkmale und Vorteile von Mystic Spice Premium Chai Tea</a:t>
             </a:r>
             <a:r>
               <a:rPr sz="1200"/>
@@ -2865,7 +2868,7 @@
                 <a:ea typeface="Aptos"/>
                 <a:cs typeface="Aptos"/>
               </a:rPr>
-              <a:t>·         Die Wettbewerbsanalyse von Chai-Tee in Lateinamerika</a:t>
+              <a:t>·          Markttrend und Nachfrage nach Chai-Tee in Lateinamerika</a:t>
             </a:r>
             <a:r>
               <a:rPr sz="1200"/>
@@ -2882,7 +2885,7 @@
                 <a:ea typeface="Aptos"/>
                 <a:cs typeface="Aptos"/>
               </a:rPr>
-              <a:t>·         Die Vertriebskanäle für Chai-Tee in Lateinamerika</a:t>
+              <a:t>··        Wettbewerbsanalyse von Chai-Tee in Lateinamerika</a:t>
             </a:r>
             <a:r>
               <a:rPr sz="1200"/>
@@ -2899,7 +2902,7 @@
                 <a:ea typeface="Aptos"/>
                 <a:cs typeface="Aptos"/>
               </a:rPr>
-              <a:t>·         Der Promotionsplan und die Strategie für Chai-Tee in Lateinamerika</a:t>
+              <a:t>·          Vertriebskanäle von Chai-Tee in Lateinamerika</a:t>
             </a:r>
             <a:r>
               <a:rPr sz="1200"/>
@@ -2916,7 +2919,7 @@
                 <a:ea typeface="Aptos"/>
                 <a:cs typeface="Aptos"/>
               </a:rPr>
-              <a:t>·         Die erwarteten Ergebnisse und Herausforderungen des Förderplans</a:t>
+              <a:t>·         Absatzförderungsplan und die Strategie für Chai-Tee in Lateinamerika</a:t>
             </a:r>
             <a:r>
               <a:rPr sz="1200"/>
@@ -2933,7 +2936,24 @@
                 <a:ea typeface="Aptos"/>
                 <a:cs typeface="Aptos"/>
               </a:rPr>
-              <a:t>·         Die Empfehlungen und Schlussfolgerungen für die Zukunft von Chai-Tee in Lateinamerika</a:t>
+              <a:t>··        Erwartete Ergebnisse und Herausforderungen des Absatzförderungsplans</a:t>
+            </a:r>
+            <a:r>
+              <a:rPr sz="1200"/>
+              <a:t>
+</a:t>
+            </a:r>
+            <a:r>
+              <a:rPr lang="de-DE" sz="1200" b="0" i="0" strike="noStrike" cap="none" baseline="0">
+                <a:solidFill>
+                  <a:srgbClr val="000000"/>
+                </a:solidFill>
+                <a:effectLst/>
+                <a:latin typeface="Aptos"/>
+                <a:ea typeface="Aptos"/>
+                <a:cs typeface="Aptos"/>
+              </a:rPr>
+              <a:t>·         Empfehlungen und Schlussfolgerungen für die Zukunft von Chai-Tee in Lateinamerika</a:t>
             </a:r>
             <a:r>
               <a:rPr sz="1200"/>
@@ -3055,7 +3075,7 @@
                 <a:ea typeface="Aptos"/>
                 <a:cs typeface="Aptos"/>
               </a:rPr>
-              <a:t>Jede Tasse bringt Sie auf eine Reise durch die lebhaften Landschaften Indiens und bringt Ihnen ein authentisches Chai-Erlebnis zu Ihrem Zuhause.</a:t>
+              <a:t>Jede Tasse Chai-Tee ist wie eine bezaubernde Reise durch die pulsierenden Landschaften Indiens und  authentischer Chai-Genuss bei Ihnen zu Hause..</a:t>
             </a:r>
             <a:r>
               <a:rPr sz="1200"/>
@@ -3082,7 +3102,7 @@
                 <a:ea typeface="Aptos"/>
                 <a:cs typeface="Aptos"/>
               </a:rPr>
-              <a:t>Original Content:</a:t>
+              <a:t>Originalinhalt::</a:t>
             </a:r>
             <a:r>
               <a:rPr sz="1200"/>
@@ -3116,7 +3136,7 @@
                 <a:ea typeface="Aptos"/>
                 <a:cs typeface="Aptos"/>
               </a:rPr>
-              <a:t>Mystic Spice Premium Chai Tea ist eine sorgfältig gestaltete Mischung, die den zeitlosen Traditionen der indischen Chai huldigt.</a:t>
+              <a:t>Mystic Spice Premium Chai Tea ist eine sorgfältig hergestellte Mischung und eine Hommage an die zeitlosen Traditionen des indischen Chai.</a:t>
             </a:r>
             <a:r>
               <a:rPr lang="de-DE" sz="1200" b="0" i="0" strike="noStrike" cap="none" baseline="0">
@@ -3164,7 +3184,12 @@
                 <a:ea typeface="Aptos"/>
                 <a:cs typeface="Aptos"/>
               </a:rPr>
-              <a:t>Die Produktbeschreibung, die Merkmale und der Nutzen von Mystic Spice Premium Chai Tea sind in der folgenden Tabelle zusammengefasst:</a:t>
+              <a:t>Die Produktbeschreibung, die Merkmale und die Vorteile von Mystic Spice Premium Chai Tea sind in der folgenden Tabelle zusammengefasst:</a:t>
+            </a:r>
+            <a:r>
+              <a:rPr sz="1200"/>
+              <a:t>
+</a:t>
             </a:r>
           </a:p>
         </p:txBody>
@@ -3491,7 +3516,7 @@
                 <a:ea typeface="Aptos"/>
                 <a:cs typeface="Aptos"/>
               </a:rPr>
-              <a:t>Zu den Haupttreibern des Wachstums gehören die Erhöhung des Bewusstseins, das steigende verfügbare Einkommen und die wachsende Verteilung.</a:t>
+              <a:t>Zu den wichtigsten Wachstumstreibern gehören das zunehmende Bewusstsein, steigendes Einkommen und die Ausweitung des Vertriebs.</a:t>
             </a:r>
             <a:r>
               <a:rPr sz="1200"/>
@@ -3518,7 +3543,7 @@
                 <a:ea typeface="Aptos"/>
                 <a:cs typeface="Aptos"/>
               </a:rPr>
-              <a:t>Original Content:</a:t>
+              <a:t>Originalinhalt:</a:t>
             </a:r>
             <a:r>
               <a:rPr sz="1200"/>
@@ -3535,7 +3560,7 @@
                 <a:ea typeface="Aptos"/>
                 <a:cs typeface="Aptos"/>
               </a:rPr>
-              <a:t>Market Trend and Demand</a:t>
+              <a:t>Markttrend und Nachfrage</a:t>
             </a:r>
             <a:r>
               <a:rPr sz="1200"/>
@@ -3552,7 +3577,7 @@
                 <a:ea typeface="Aptos"/>
                 <a:cs typeface="Aptos"/>
               </a:rPr>
-              <a:t>Der lateinamerikanische Markt bietet eine großartige Gelegenheit für Chai-Tee, da die Region eine wachsende Nachfrage nach gesunden, natürlichen und exotischen Produkten hat.</a:t>
+              <a:t>Der lateinamerikanische Markt bietet eine große Chance für Chai-Tee, denn die Region verzeichnet eine wachsende Nachfrage nach gesunden, natürlichen und exotischen Produkten.</a:t>
             </a:r>
             <a:r>
               <a:rPr lang="de-DE" sz="1200" b="0" i="0" strike="noStrike" cap="none" baseline="0">
@@ -3625,66 +3650,6 @@
                 <a:cs typeface="Aptos"/>
               </a:rPr>
               <a:t>Chai-Tee passt auch zum Lebensstil und zu den Vorlieben der Bevölkerung in Lateinamerika, in der geselliges Beisammensein und der Konsum süßer Leckereien nichts Ungewöhnliches sind.</a:t>
-            </a:r>
-            <a:r>
-              <a:rPr lang="de-DE" sz="1200" b="0" i="0" strike="noStrike" cap="none" baseline="0">
-                <a:solidFill>
-                  <a:srgbClr val="000000"/>
-                </a:solidFill>
-                <a:effectLst/>
-                <a:latin typeface="Aptos"/>
-                <a:ea typeface="Aptos"/>
-                <a:cs typeface="Aptos"/>
-              </a:rPr>
-              <a:t>Laut einem Bericht von Grand View Research wurde der globale Chai-Tee-Markt im Jahr 2019 auf 1,9 Mrd. USD geschätzt und wird voraussichtlich von 2020 bis 2027 mit einer durchschnittlichen jährlichen Wachstumsrate (CAGR) von 5,5 % wachsen.</a:t>
-            </a:r>
-            <a:r>
-              <a:rPr lang="de-DE" sz="1200" b="0" i="0" strike="noStrike" cap="none" baseline="0">
-                <a:solidFill>
-                  <a:srgbClr val="000000"/>
-                </a:solidFill>
-                <a:effectLst/>
-                <a:latin typeface="Aptos"/>
-                <a:ea typeface="Aptos"/>
-                <a:cs typeface="Aptos"/>
-              </a:rPr>
-              <a:t> </a:t>
-            </a:r>
-            <a:r>
-              <a:rPr lang="de-DE" sz="1200" b="0" i="0" strike="noStrike" cap="none" baseline="0">
-                <a:solidFill>
-                  <a:srgbClr val="000000"/>
-                </a:solidFill>
-                <a:effectLst/>
-                <a:latin typeface="Aptos"/>
-                <a:ea typeface="Aptos"/>
-                <a:cs typeface="Aptos"/>
-              </a:rPr>
-              <a:t>Der Bericht besagt auch, dass Lateinamerika eine der am schnellsten wachsenden Regionen für Chai-Tee ist, mit einer CAGR von 6,2 % von 2020 bis 2027.</a:t>
-            </a:r>
-            <a:r>
-              <a:rPr lang="de-DE" sz="1200" b="0" i="0" strike="noStrike" cap="none" baseline="0">
-                <a:solidFill>
-                  <a:srgbClr val="000000"/>
-                </a:solidFill>
-                <a:effectLst/>
-                <a:latin typeface="Aptos"/>
-                <a:ea typeface="Aptos"/>
-                <a:cs typeface="Aptos"/>
-              </a:rPr>
-              <a:t> </a:t>
-            </a:r>
-            <a:r>
-              <a:rPr lang="de-DE" sz="1200" b="0" i="0" strike="noStrike" cap="none" baseline="0">
-                <a:solidFill>
-                  <a:srgbClr val="000000"/>
-                </a:solidFill>
-                <a:effectLst/>
-                <a:latin typeface="Aptos"/>
-                <a:ea typeface="Aptos"/>
-                <a:cs typeface="Aptos"/>
-              </a:rPr>
-              <a:t>Die wichtigsten Faktoren für das Wachstum von Chai-Tee in Lateinamerika sind:</a:t>
             </a:r>
             <a:r>
               <a:rPr sz="1200"/>
@@ -3701,7 +3666,55 @@
                 <a:ea typeface="Aptos"/>
                 <a:cs typeface="Aptos"/>
               </a:rPr>
-              <a:t>·         Das zunehmende Bewusstsein und Interesse an den Gesundheitlichen Vorteilen und kulturellen Aspekten von Chai Tea</a:t>
+              <a:t>Laut einem Bericht von Grand View Research wurde der globale Chai-Tee-Markt im Jahr 2019 auf 1,9 Mrd. USD geschätzt und wird voraussichtlich von 2020 bis 2027 mit einer durchschnittlichen jährlichen Wachstumsrate (CAGR) von 5,5 % wachsen.</a:t>
+            </a:r>
+            <a:r>
+              <a:rPr lang="de-DE" sz="1200" b="0" i="0" strike="noStrike" cap="none" baseline="0">
+                <a:solidFill>
+                  <a:srgbClr val="000000"/>
+                </a:solidFill>
+                <a:effectLst/>
+                <a:latin typeface="Aptos"/>
+                <a:ea typeface="Aptos"/>
+                <a:cs typeface="Aptos"/>
+              </a:rPr>
+              <a:t> </a:t>
+            </a:r>
+            <a:r>
+              <a:rPr lang="de-DE" sz="1200" b="0" i="0" strike="noStrike" cap="none" baseline="0">
+                <a:solidFill>
+                  <a:srgbClr val="000000"/>
+                </a:solidFill>
+                <a:effectLst/>
+                <a:latin typeface="Aptos"/>
+                <a:ea typeface="Aptos"/>
+                <a:cs typeface="Aptos"/>
+              </a:rPr>
+              <a:t>Der Bericht besagt auch, dass Lateinamerika eine der am schnellsten wachsenden Regionen für Chai-Tee ist, mit einer CAGR von 6,2 % von 2020 bis 2027.</a:t>
+            </a:r>
+            <a:r>
+              <a:rPr lang="de-DE" sz="1200" b="0" i="0" strike="noStrike" cap="none" baseline="0">
+                <a:solidFill>
+                  <a:srgbClr val="000000"/>
+                </a:solidFill>
+                <a:effectLst/>
+                <a:latin typeface="Aptos"/>
+                <a:ea typeface="Aptos"/>
+                <a:cs typeface="Aptos"/>
+              </a:rPr>
+              <a:t> </a:t>
+            </a:r>
+            <a:r>
+              <a:rPr lang="de-DE" sz="1200" b="0" i="0" strike="noStrike" cap="none" baseline="0">
+                <a:solidFill>
+                  <a:srgbClr val="000000"/>
+                </a:solidFill>
+                <a:effectLst/>
+                <a:latin typeface="Aptos"/>
+                <a:ea typeface="Aptos"/>
+                <a:cs typeface="Aptos"/>
+              </a:rPr>
+              <a:t>Die wichtigsten Faktoren für das Wachstum von Chai-Tee in Lateinamerika:</a:t>
             </a:r>
             <a:r>
               <a:rPr sz="1200"/>
@@ -3718,7 +3731,7 @@
                 <a:ea typeface="Aptos"/>
                 <a:cs typeface="Aptos"/>
               </a:rPr>
-              <a:t>·         Das steigende verfügbare Einkommen und die Ausgabenleistung der Verbraucher</a:t>
+              <a:t>·Das zunehmende Bewusstsein und Interesse an den gesundheitlichen Vorteilen und kulturellen Aspekten von Chai Tea</a:t>
             </a:r>
             <a:r>
               <a:rPr sz="1200"/>
@@ -3735,7 +3748,7 @@
                 <a:ea typeface="Aptos"/>
                 <a:cs typeface="Aptos"/>
               </a:rPr>
-              <a:t> der Mittelschicht·         Die wachsende Beliebtheit von Spezial- und Premium-Tees unter den jüngeren und städtischen Segmenten</a:t>
+              <a:t>·   Wachsende Einkommen und die steigende Kaufkraft der Verbraucher und der Mittelschicht</a:t>
             </a:r>
             <a:r>
               <a:rPr sz="1200"/>
@@ -3752,7 +3765,7 @@
                 <a:ea typeface="Aptos"/>
                 <a:cs typeface="Aptos"/>
               </a:rPr>
-              <a:t>·         Die expandierende Verteilung und Verfügbarkeit von Chai-Teeprodukten in verschiedenen Kanälen, wie Supermärkten, Cafés und Online-Plattformen</a:t>
+              <a:t>      Die zunehmende Beliebtheit von Spezial- und Premium-Tees unter den jüngeren und städtischen Zielgruppen</a:t>
             </a:r>
             <a:r>
               <a:rPr sz="1200"/>
@@ -3769,7 +3782,24 @@
                 <a:ea typeface="Aptos"/>
                 <a:cs typeface="Aptos"/>
               </a:rPr>
-              <a:t>·         Die Entstehung neuer und innovativer Aromen und Formate von Chai-Tee, wie Ready-to-Drink, Instant und Bio-Sorten</a:t>
+              <a:t>·     Der expandierende Vertrieb und das Angebot von Chai-Tee-Produkten über die Vertriebskanäle, wie etwa Supermärkte, Cafés und Online-Plattformen</a:t>
+            </a:r>
+            <a:r>
+              <a:rPr sz="1200"/>
+              <a:t>
+</a:t>
+            </a:r>
+            <a:r>
+              <a:rPr lang="de-DE" sz="1200" b="0" i="0" strike="noStrike" cap="none" baseline="0">
+                <a:solidFill>
+                  <a:srgbClr val="000000"/>
+                </a:solidFill>
+                <a:effectLst/>
+                <a:latin typeface="Aptos"/>
+                <a:ea typeface="Aptos"/>
+                <a:cs typeface="Aptos"/>
+              </a:rPr>
+              <a:t>·     Die Entwicklung neuer und innovativer Aromen und Formate von Chai-Tee, wie etwa Ready-to-Drink, Instant und Bio-Sorten</a:t>
             </a:r>
             <a:r>
               <a:rPr sz="1200"/>
@@ -3939,7 +3969,7 @@
                 <a:ea typeface="Aptos"/>
                 <a:cs typeface="Aptos"/>
               </a:rPr>
-              <a:t>Großhändler verkaufen massenweise an Einzelhändler, während Händler Produkte von Herstellern zu Einzelhändlern transportieren.</a:t>
+              <a:t>Großhändler verkaufen Massengüter an Einzelhändler und die Vertriebshändler liefern und befördern die Produkte von den Herstellern zu den Einzelhändlern.</a:t>
             </a:r>
             <a:r>
               <a:rPr sz="1200"/>
@@ -3966,7 +3996,7 @@
                 <a:ea typeface="Aptos"/>
                 <a:cs typeface="Aptos"/>
               </a:rPr>
-              <a:t>Original Content:</a:t>
+              <a:t>Originalinhalt:</a:t>
             </a:r>
             <a:r>
               <a:rPr sz="1200"/>
@@ -3983,7 +4013,7 @@
                 <a:ea typeface="Aptos"/>
                 <a:cs typeface="Aptos"/>
               </a:rPr>
-              <a:t>Die Vertriebskanäle für Chai-Tee in Lateinamerika sind die Möglichkeiten und Mittel, mit denen Chai-Teeprodukte an die Endverbraucher geliefert und verkauft werden.</a:t>
+              <a:t>Die Vertriebskanäle von Chai-Tee in Lateinamerika sind die Mittel und Wege, über die Chai-Tee-Produkte an die Endverbraucher*innen geliefert und verkauft werden.</a:t>
             </a:r>
             <a:r>
               <a:rPr lang="de-DE" sz="1200" b="0" i="0" strike="noStrike" cap="none" baseline="0">
@@ -4007,7 +4037,12 @@
                 <a:ea typeface="Aptos"/>
                 <a:cs typeface="Aptos"/>
               </a:rPr>
-              <a:t>Die Vertriebskanäle für Chai-Tee in Lateinamerika lassen sich in drei Typen einteilen: Einzelhandel, Großhandel und Vertriebspartner.</a:t>
+              <a:t>Die Vertriebskanäle für Chai-Tee in Lateinamerika lassen sich in drei Typen unterteilen: Einzelhandel, Großhandel und Vertriebspartner.</a:t>
+            </a:r>
+            <a:r>
+              <a:rPr sz="1200"/>
+              <a:t>
+</a:t>
             </a:r>
             <a:r>
               <a:rPr lang="de-DE" sz="1200" b="0" i="0" strike="noStrike" cap="none" baseline="0">
@@ -4092,6 +4127,11 @@
                 <a:cs typeface="Aptos"/>
               </a:rPr>
               <a:t>Zu den wichtigsten Einzelhandelsunternehmen für Chai-Tee-Produkte in Lateinamerika gehören Walmart, Carrefour, Oxxo, Starbucks und Amazon.</a:t>
+            </a:r>
+            <a:r>
+              <a:rPr sz="1200"/>
+              <a:t>
+</a:t>
             </a:r>
           </a:p>
         </p:txBody>
@@ -4232,7 +4272,7 @@
                 <a:ea typeface="Aptos"/>
                 <a:cs typeface="Aptos"/>
               </a:rPr>
-              <a:t>Zu den großen Großhändlern in Lateinamerika gehören Cencosud, Grupo Pao de Acucar, La Anonima und Makro.</a:t>
+              <a:t>Zu den wichtigsten Großhandelsunternehmen von Chai-Tee-Produkten in Lateinamerika gehören Cencosud, Grupo Pão de Açúcar, La Anónima und Makro.</a:t>
             </a:r>
             <a:r>
               <a:rPr sz="1200"/>
@@ -4259,7 +4299,7 @@
                 <a:ea typeface="Aptos"/>
                 <a:cs typeface="Aptos"/>
               </a:rPr>
-              <a:t>Original Content:</a:t>
+              <a:t>Originalinhalt:</a:t>
             </a:r>
             <a:r>
               <a:rPr sz="1200"/>
@@ -4276,7 +4316,7 @@
                 <a:ea typeface="Aptos"/>
                 <a:cs typeface="Aptos"/>
               </a:rPr>
-              <a:t>Wholesalers sind die Unternehmen, die Chai-Teeprodukte in Massen von den Herstellern oder Distributoren kaufen und sie an die Einzelhändler oder andere Vermittler verkaufen.</a:t>
+              <a:t>Großhändler sind die Unternehmen, die Chai-Tee-Produkte als Massengüter von den Herstellern oder Vertriebshändlern kaufen und sie an Einzelhändler oder andere Zwischenhändler verkaufen.</a:t>
             </a:r>
             <a:r>
               <a:rPr lang="de-DE" sz="1200" b="0" i="0" strike="noStrike" cap="none" baseline="0">
@@ -4348,7 +4388,12 @@
                 <a:ea typeface="Aptos"/>
                 <a:cs typeface="Aptos"/>
               </a:rPr>
-              <a:t>Zu den wichtigsten Großhändlern von Chai-Tee-Produkten in Lateinamerika gehören Cencosud, Grupo Pão de Açúcar, La Anónima und Makro.</a:t>
+              <a:t>Zu den wichtigsten Großhandelsunternehmen von Chai-Tee-Produkten in Lateinamerika gehören Cencosud, Grupo Pão de Açúcar, La Anónima und Makro.</a:t>
+            </a:r>
+            <a:r>
+              <a:rPr sz="1200"/>
+              <a:t>
+</a:t>
             </a:r>
           </a:p>
         </p:txBody>
@@ -8606,7 +8651,7 @@
                 <a:ea typeface="Bookman Old Style"/>
                 <a:cs typeface="Bookman Old Style"/>
               </a:rPr>
-              <a:t>Vertriebskanäle: Distributoren</a:t>
+              <a:t>Vertriebskanäle: Vertriebspartner</a:t>
             </a:r>
           </a:p>
         </p:txBody>
@@ -12056,6 +12101,18 @@
                     <a:lstStyle/>
                     <a:p>
                       <a:r>
+                        <a:rPr lang="de-DE" sz="3300" b="1" i="0" strike="noStrike" cap="none" baseline="0">
+                          <a:solidFill>
+                            <a:srgbClr val="FFFFFF"/>
+                          </a:solidFill>
+                          <a:effectLst/>
+                          <a:latin typeface="Franklin Gothic Book"/>
+                          <a:ea typeface="Franklin Gothic Book"/>
+                          <a:cs typeface="Franklin Gothic Book"/>
+                        </a:rPr>
+                        <a:t>Produktbeschreibung</a:t>
+                      </a:r>
+                      <a:r>
                         <a:rPr lang="de-DE" sz="3300" b="0" i="0" strike="noStrike" cap="none" baseline="0">
                           <a:solidFill>
                             <a:srgbClr val="FFFFFF"/>
@@ -12065,7 +12122,7 @@
                           <a:ea typeface="Franklin Gothic Book"/>
                           <a:cs typeface="Franklin Gothic Book"/>
                         </a:rPr>
-                        <a:t>Produktbeschreibung</a:t>
+                        <a:t>:</a:t>
                       </a:r>
                     </a:p>
                   </a:txBody>
@@ -12474,7 +12531,7 @@
         </p:nvGraphicFramePr>
         <p:xfrm>
           <a:off x="1096963" y="2287915"/>
-          <a:ext cx="10058401" cy="3910914"/>
+          <a:ext cx="10058401" cy="4124274"/>
         </p:xfrm>
         <a:graphic>
           <a:graphicData uri="http://schemas.openxmlformats.org/drawingml/2006/table">
@@ -12539,6 +12596,18 @@
                         </a:spcAft>
                       </a:pPr>
                       <a:r>
+                        <a:rPr lang="de-DE" sz="1400" b="1" i="0" strike="noStrike" cap="none" baseline="0">
+                          <a:solidFill>
+                            <a:srgbClr val="FFFFFF"/>
+                          </a:solidFill>
+                          <a:effectLst/>
+                          <a:latin typeface="Franklin Gothic Book"/>
+                          <a:ea typeface="Franklin Gothic Book"/>
+                          <a:cs typeface="Franklin Gothic Book"/>
+                        </a:rPr>
+                        <a:t>Produktbeschreibung</a:t>
+                      </a:r>
+                      <a:r>
                         <a:rPr lang="de-DE" sz="1400" b="0" i="0" strike="noStrike" cap="none" baseline="0">
                           <a:solidFill>
                             <a:srgbClr val="FFFFFF"/>
@@ -12548,7 +12617,7 @@
                           <a:ea typeface="Franklin Gothic Book"/>
                           <a:cs typeface="Franklin Gothic Book"/>
                         </a:rPr>
-                        <a:t>Produktbeschreibung</a:t>
+                        <a:t>:</a:t>
                       </a:r>
                       <a:endParaRPr lang="en-US" sz="2300">
                         <a:effectLst/>
@@ -12738,7 +12807,7 @@
                           <a:ea typeface="Franklin Gothic Book"/>
                           <a:cs typeface="Franklin Gothic Book"/>
                         </a:rPr>
-                        <a:t>Authentic Blend: Unsere Chai ist eine harmonische Mischung aus Premium-Schwarzen Teeblättern und einer charakteristischen Auswahl an gemahlenen Gewürzen, darunter Knoblauch, Karamom, Gerinnsel, Ingwer und schwarzer Pfeffer.</a:t>
+                        <a:t>Authentischer Blend: Unser Chai ist eine harmonische Mischung aus schwarzen Teeblättern in Premiumqualität und einer charakteristischen Auswahl an gemahlenen Gewürzen, darunter Knoblauch, Karamom, Gerinnsel, Ingwer und schwarzer Pfeffer.</a:t>
                       </a:r>
                       <a:r>
                         <a:rPr lang="de-DE" sz="1400" b="0" i="0" strike="noStrike" cap="none" baseline="0">
@@ -12791,7 +12860,7 @@
                           <a:ea typeface="Franklin Gothic Book"/>
                           <a:cs typeface="Franklin Gothic Book"/>
                         </a:rPr>
-                        <a:t>Gesundheitsfördernde Inhaltsstoffe: Jeder Bestandteil von Mystisch Gewürz-Chai-Tee wird für seine natürlichen Gesundheitlichen Vorteile ausgewählt.</a:t>
+                        <a:t>Gesundheitsfördernde Inhaltsstoffe: Die Zutaten von Mystic Spice Chai Tea werden nach ihren Vorteilen für die Gesundheit ausgewählt.</a:t>
                       </a:r>
                       <a:r>
                         <a:rPr lang="de-DE" sz="1400" b="0" i="0" strike="noStrike" cap="none" baseline="0">
@@ -13229,7 +13298,7 @@
         </p:nvGraphicFramePr>
         <p:xfrm>
           <a:off x="5282335" y="1994843"/>
-          <a:ext cx="6275668" cy="4012742"/>
+          <a:ext cx="6275668" cy="4180382"/>
         </p:xfrm>
         <a:graphic>
           <a:graphicData uri="http://schemas.openxmlformats.org/drawingml/2006/table">
@@ -13294,6 +13363,18 @@
                         </a:spcAft>
                       </a:pPr>
                       <a:r>
+                        <a:rPr lang="de-DE" sz="1100" b="1" i="0" strike="noStrike" cap="none" baseline="0">
+                          <a:solidFill>
+                            <a:srgbClr val="FFFFFF"/>
+                          </a:solidFill>
+                          <a:effectLst/>
+                          <a:latin typeface="Franklin Gothic Book"/>
+                          <a:ea typeface="Franklin Gothic Book"/>
+                          <a:cs typeface="Franklin Gothic Book"/>
+                        </a:rPr>
+                        <a:t>Produktbeschreibung</a:t>
+                      </a:r>
+                      <a:r>
                         <a:rPr lang="de-DE" sz="1100" b="0" i="0" strike="noStrike" cap="none" baseline="0">
                           <a:solidFill>
                             <a:srgbClr val="FFFFFF"/>
@@ -13303,7 +13384,7 @@
                           <a:ea typeface="Franklin Gothic Book"/>
                           <a:cs typeface="Franklin Gothic Book"/>
                         </a:rPr>
-                        <a:t>Produktbeschreibung</a:t>
+                        <a:t>:</a:t>
                       </a:r>
                       <a:endParaRPr lang="en-US" sz="1700">
                         <a:effectLst/>
@@ -13339,7 +13420,7 @@
                           <a:ea typeface="Franklin Gothic Book"/>
                           <a:cs typeface="Franklin Gothic Book"/>
                         </a:rPr>
-                        <a:t>Reichhaltiges Aroma und Geschmack: Das warme, würzige Aroma und tiefe, belebende Geschmack unserer Chai machen es zum perfekten Getränk, um Ihren Tag zu beginnen oder sich am Abend zu entspannen.</a:t>
+                        <a:t>Reichhaltig an Aroma und Geschmack: Das warme, würzige Aroma und der belebende Geschmack unseres Chai machen ihn zum perfekten Getränk zum Tagesanfang oder an einem erholsamen Abend.</a:t>
                       </a:r>
                       <a:r>
                         <a:rPr lang="de-DE" sz="1100" b="0" i="0" strike="noStrike" cap="none" baseline="0">
@@ -13392,7 +13473,7 @@
                           <a:ea typeface="Franklin Gothic Book"/>
                           <a:cs typeface="Franklin Gothic Book"/>
                         </a:rPr>
-                        <a:t>Vielseitige Brauoptionen: Ob Sie Ihre Chai heiß dampfen, als erfrischender Eistee oder als cremefarbene Latte lieben, ist unsere Mischung vielseitig genug für jede Vorliebe.</a:t>
+                        <a:t>Vielseitige Zubereitungsmöglichkeiten: Genießen Sie Ihren Chai dampfend heiß, als erfrischenden Eistee oder als cremefarbenen Chai Latte, unsere vielseitige Mischung erfüllt Ihnen jeden Wunsch.</a:t>
                       </a:r>
                       <a:r>
                         <a:rPr lang="de-DE" sz="1100" b="0" i="0" strike="noStrike" cap="none" baseline="0">
@@ -13452,7 +13533,7 @@
                           <a:ea typeface="Franklin Gothic Book"/>
                           <a:cs typeface="Franklin Gothic Book"/>
                         </a:rPr>
-                        <a:t>Nachhaltig gewonnen: Wir engagieren uns für Nachhaltigkeit, wir beziehen unsere Zutaten aus kleinflächigen Farmen, die ökologische Landwirtschaft betreiben, und sorgen nicht nur für die feinste Qualität, sondern auch für das Wohlergehen unseres Planeten.</a:t>
+                        <a:t>Nachhaltig gewonnen: Wir engagieren uns für Nachhaltigkeit, wir beziehen unsere Inhaltsstoffe von kleinen Bauernhöfen, die ökologische Landwirtschaft betreiben.  Sie sorgen nicht nur für die feinste Qualität, sondern auch für das Wohlergehen unseres Planeten.</a:t>
                       </a:r>
                       <a:endParaRPr lang="en-US" sz="1700">
                         <a:effectLst/>
@@ -13481,7 +13562,7 @@
                           <a:ea typeface="Franklin Gothic Book"/>
                           <a:cs typeface="Franklin Gothic Book"/>
                         </a:rPr>
-                        <a:t>Elegante Verpackung: Mystisch Gewürz-Chai-Tee kommt in wunderschön gestalteten, umweltfreundlichen Verpackungen, sodass es ein ideales Geschenk für Teeliebhaber oder ein luxuriöser Genuss für sich selbst ist.</a:t>
+                        <a:t>Elegante Verpackung: Mit wunderschön gestalteter umweltfreundlicher Verpackung ist der Mystic Spice Chai Tea  das perfekte Geschenk für Teeliebhaber oder ein luxuriöser Genuss  für Sie selbst.</a:t>
                       </a:r>
                       <a:endParaRPr lang="en-US" sz="1700">
                         <a:effectLst/>
@@ -13517,7 +13598,7 @@
                           <a:ea typeface="Franklin Gothic Book"/>
                           <a:cs typeface="Franklin Gothic Book"/>
                         </a:rPr>
-                        <a:t>Kundenzufriedenheitsgarantie: Wir stehen hinter unserem Produkt und bieten eine Zufriedenheitsgarantie.</a:t>
+                        <a:t>Mit Kundenzufriedenheitsgarantie: Wir stehen hinter unserem Produkt und bieten Ihnen eine Zufriedenheitsgarantie.</a:t>
                       </a:r>
                       <a:r>
                         <a:rPr lang="de-DE" sz="1100" b="0" i="0" strike="noStrike" cap="none" baseline="0">
@@ -13570,7 +13651,7 @@
                           <a:ea typeface="Franklin Gothic Book"/>
                           <a:cs typeface="Franklin Gothic Book"/>
                         </a:rPr>
-                        <a:t>Ideal für: Tee-Enthusiasten, gesundheitsbewusste Einzelpersonen, Liebhaber warmer, würziger Getränke und jeder, der die reichen Aromen der traditionellen indischen Chai erkunden möchte.</a:t>
+                        <a:t>Perfekt geeignet für: Tee-Enthusiasten, gesundheitsbewusste Liebhaber warmer und würziger Getränke und jeden, der die reichen Aromen der traditionellen indischen Chai erkunden möchte.</a:t>
                       </a:r>
                       <a:endParaRPr lang="en-US" sz="1700">
                         <a:effectLst/>
@@ -14187,7 +14268,7 @@
         </p:nvGraphicFramePr>
         <p:xfrm>
           <a:off x="643192" y="1541387"/>
-          <a:ext cx="5115348" cy="3728172"/>
+          <a:ext cx="5115348" cy="4032972"/>
         </p:xfrm>
         <a:graphic>
           <a:graphicData uri="http://schemas.openxmlformats.org/drawingml/2006/table">
@@ -14263,7 +14344,7 @@
                     <a:lstStyle/>
                     <a:p>
                       <a:r>
-                        <a:rPr lang="de-DE" sz="2000" b="0" i="0" strike="noStrike" cap="all" baseline="0">
+                        <a:rPr lang="de-DE" sz="2000" b="1" i="0" strike="noStrike" cap="all" baseline="0">
                           <a:solidFill>
                             <a:srgbClr val="000000"/>
                           </a:solidFill>
@@ -14272,7 +14353,7 @@
                           <a:ea typeface="Franklin Gothic Book"/>
                           <a:cs typeface="Franklin Gothic Book"/>
                         </a:rPr>
-                        <a:t>Größe des Chai-Tee-Marktes (Mrd. USD)</a:t>
+                        <a:t>Größe des Chai-Tee-Marketes (Mrd. USD)</a:t>
                       </a:r>
                     </a:p>
                   </a:txBody>
@@ -14298,7 +14379,7 @@
                     <a:lstStyle/>
                     <a:p>
                       <a:r>
-                        <a:rPr lang="de-DE" sz="2000" b="0" i="0" strike="noStrike" cap="all" baseline="0">
+                        <a:rPr lang="de-DE" sz="2000" b="1" i="0" strike="noStrike" cap="all" baseline="0">
                           <a:solidFill>
                             <a:srgbClr val="000000"/>
                           </a:solidFill>
@@ -14307,7 +14388,7 @@
                           <a:ea typeface="Franklin Gothic Book"/>
                           <a:cs typeface="Franklin Gothic Book"/>
                         </a:rPr>
-                        <a:t>CAGR (2020–2027)</a:t>
+                        <a:t>CAGR (2020-2027)</a:t>
                       </a:r>
                     </a:p>
                   </a:txBody>
@@ -14915,7 +14996,7 @@
                 <a:ea typeface="Franklin Gothic Book"/>
                 <a:cs typeface="Franklin Gothic Book"/>
               </a:rPr>
-              <a:t>Großhändler: Verkaufen von Chai-Teeprodukten in Massen an Einzelhändler</a:t>
+              <a:t>Großhändler: Verkauf von Chai-Teeprodukten in Massen an Einzelhändler</a:t>
             </a:r>
           </a:p>
           <a:p>
@@ -14929,7 +15010,7 @@
                 <a:ea typeface="Franklin Gothic Book"/>
                 <a:cs typeface="Franklin Gothic Book"/>
               </a:rPr>
-              <a:t>Distributoren: Transport Chai Teeprodukte von Herstellern zu Einzelhändlern</a:t>
+              <a:t>Distributoren: Lieferung der Chai-Tee-Produkte von Herstellern zu Einzelhändlern</a:t>
             </a:r>
           </a:p>
         </p:txBody>
@@ -15132,7 +15213,7 @@
                 <a:ea typeface="Bookman Old Style"/>
                 <a:cs typeface="Bookman Old Style"/>
               </a:rPr>
-              <a:t>Vertriebskanäle: Großhändler</a:t>
+              <a:t>Vertriebskanäle: Großhandelsunternehmen</a:t>
             </a:r>
           </a:p>
         </p:txBody>

</xml_diff>

<commit_message>
Copy Files From Source Repo (2025-02-10 19:17)
</commit_message>
<xml_diff>
--- a/ResourceFiles/Mystic Spice Premium Chai Market Analysis Presentation.pptx
+++ b/ResourceFiles/Mystic Spice Premium Chai Market Analysis Presentation.pptx
@@ -10779,7 +10779,7 @@
                 <a:ea typeface="Bookman Old Style"/>
                 <a:cs typeface="Bookman Old Style"/>
               </a:rPr>
-              <a:t>Agenda</a:t>
+              <a:t>Tagesordnung</a:t>
             </a:r>
           </a:p>
         </p:txBody>
@@ -10898,7 +10898,7 @@
                 <a:ea typeface="Franklin Gothic Book"/>
                 <a:cs typeface="Franklin Gothic Book"/>
               </a:rPr>
-              <a:t>Produktbeschreibung</a:t>
+              <a:t>Produktbeschreibung:</a:t>
             </a:r>
           </a:p>
           <a:p>
@@ -11878,7 +11878,7 @@
                 <a:ea typeface="Bookman Old Style"/>
                 <a:cs typeface="Bookman Old Style"/>
               </a:rPr>
-              <a:t>Produktbeschreibung</a:t>
+              <a:t>Produktbeschreibung:</a:t>
             </a:r>
           </a:p>
         </p:txBody>
@@ -12807,7 +12807,7 @@
                           <a:ea typeface="Franklin Gothic Book"/>
                           <a:cs typeface="Franklin Gothic Book"/>
                         </a:rPr>
-                        <a:t>Authentischer Blend: Unser Chai ist eine harmonische Mischung aus schwarzen Teeblättern in Premiumqualität und einer charakteristischen Auswahl an gemahlenen Gewürzen, darunter Knoblauch, Karamom, Gerinnsel, Ingwer und schwarzer Pfeffer.</a:t>
+                        <a:t>Authentische Mischung: Unser Chai ist eine harmonische Mischung aus hochwertigen Schwarzteeblättern und einer charakteristischen Auswahl an gemahlenen Gewürzen wie Zimt, Kardamom, Nelken, Ingwer und schwarzem Pfeffer.</a:t>
                       </a:r>
                       <a:r>
                         <a:rPr lang="de-DE" sz="1400" b="0" i="0" strike="noStrike" cap="none" baseline="0">
@@ -12860,7 +12860,7 @@
                           <a:ea typeface="Franklin Gothic Book"/>
                           <a:cs typeface="Franklin Gothic Book"/>
                         </a:rPr>
-                        <a:t>Gesundheitsfördernde Inhaltsstoffe: Die Zutaten von Mystic Spice Chai Tea werden nach ihren Vorteilen für die Gesundheit ausgewählt.</a:t>
+                        <a:t>Gesundheitsfördernde Zutaten: Alle Inhaltsstoffe des Mystic Spice Chai Tea werden aufgrund ihrer natürlichen gesundheitsfördernden Eigenschaften ausgewählt.</a:t>
                       </a:r>
                       <a:r>
                         <a:rPr lang="de-DE" sz="1400" b="0" i="0" strike="noStrike" cap="none" baseline="0">
@@ -13473,7 +13473,7 @@
                           <a:ea typeface="Franklin Gothic Book"/>
                           <a:cs typeface="Franklin Gothic Book"/>
                         </a:rPr>
-                        <a:t>Vielseitige Zubereitungsmöglichkeiten: Genießen Sie Ihren Chai dampfend heiß, als erfrischenden Eistee oder als cremefarbenen Chai Latte, unsere vielseitige Mischung erfüllt Ihnen jeden Wunsch.</a:t>
+                        <a:t>Vielfältige Zubereitungsmöglichkeiten: Ob Sie Ihren Chai dampfend heiß, als erfrischenden Eistee oder als cremigen Latte mögen, unsere Mischung ist vielseitig, um allen Vorlieben gerecht zu werden.</a:t>
                       </a:r>
                       <a:r>
                         <a:rPr lang="de-DE" sz="1100" b="0" i="0" strike="noStrike" cap="none" baseline="0">
@@ -13533,7 +13533,7 @@
                           <a:ea typeface="Franklin Gothic Book"/>
                           <a:cs typeface="Franklin Gothic Book"/>
                         </a:rPr>
-                        <a:t>Nachhaltig gewonnen: Wir engagieren uns für Nachhaltigkeit, wir beziehen unsere Inhaltsstoffe von kleinen Bauernhöfen, die ökologische Landwirtschaft betreiben.  Sie sorgen nicht nur für die feinste Qualität, sondern auch für das Wohlergehen unseres Planeten.</a:t>
+                        <a:t>Nachhaltig gewonnen: Da wir uns der Nachhaltigkeit verpflichtet haben, beziehen wir unsere Zutaten von kleinen Bauernhöfen, die ökologische Landwirtschaft betreiben. So garantieren wir nicht nur beste Qualität, sondern tragen auch zum Wohlergehen unseres Planeten bei.</a:t>
                       </a:r>
                       <a:endParaRPr lang="en-US" sz="1700">
                         <a:effectLst/>
@@ -13562,7 +13562,7 @@
                           <a:ea typeface="Franklin Gothic Book"/>
                           <a:cs typeface="Franklin Gothic Book"/>
                         </a:rPr>
-                        <a:t>Elegante Verpackung: Mit wunderschön gestalteter umweltfreundlicher Verpackung ist der Mystic Spice Chai Tea  das perfekte Geschenk für Teeliebhaber oder ein luxuriöser Genuss  für Sie selbst.</a:t>
+                        <a:t>Elegante Verpackung: Mystic Spice Chai Tea wird in einer wunderschönen, umweltfreundlichen Verpackung geliefert, die ihn zu einem idealen Geschenk für Teeliebhaber oder zu einem luxuriösen Genuss für Sie selbst macht.</a:t>
                       </a:r>
                       <a:endParaRPr lang="en-US" sz="1700">
                         <a:effectLst/>
@@ -13598,7 +13598,7 @@
                           <a:ea typeface="Franklin Gothic Book"/>
                           <a:cs typeface="Franklin Gothic Book"/>
                         </a:rPr>
-                        <a:t>Mit Kundenzufriedenheitsgarantie: Wir stehen hinter unserem Produkt und bieten Ihnen eine Zufriedenheitsgarantie.</a:t>
+                        <a:t>Kundenzufriedenheitsgarantie: Wir stehen hinter unserem Produkt und bieten eine Zufriedenheitsgarantie.</a:t>
                       </a:r>
                       <a:r>
                         <a:rPr lang="de-DE" sz="1100" b="0" i="0" strike="noStrike" cap="none" baseline="0">
@@ -13651,7 +13651,7 @@
                           <a:ea typeface="Franklin Gothic Book"/>
                           <a:cs typeface="Franklin Gothic Book"/>
                         </a:rPr>
-                        <a:t>Perfekt geeignet für: Tee-Enthusiasten, gesundheitsbewusste Liebhaber warmer und würziger Getränke und jeden, der die reichen Aromen der traditionellen indischen Chai erkunden möchte.</a:t>
+                        <a:t>Ideal für: Teeliebhaber, gesundheitsbewusste Menschen, Liebhaber von warmen, würzigen Getränken und alle, die den reichen Geschmack des traditionellen indischen Chai entdecken möchten.</a:t>
                       </a:r>
                       <a:endParaRPr lang="en-US" sz="1700">
                         <a:effectLst/>

</xml_diff>